<commit_message>
User story - final
</commit_message>
<xml_diff>
--- a/User_story/Yoon User Stories.pptx
+++ b/User_story/Yoon User Stories.pptx
@@ -17,6 +17,8 @@
     <p:sldId id="276" r:id="rId11"/>
     <p:sldId id="277" r:id="rId12"/>
     <p:sldId id="278" r:id="rId13"/>
+    <p:sldId id="280" r:id="rId14"/>
+    <p:sldId id="281" r:id="rId15"/>
   </p:sldIdLst>
   <p:sldSz cx="12192000" cy="6858000"/>
   <p:notesSz cx="6858000" cy="9144000"/>
@@ -123,16 +125,12 @@
 </p:presentation>
 </file>
 
-<file path=ppt/revisionInfo.xml><?xml version="1.0" encoding="utf-8"?>
-<p1510:revInfo xmlns:a="http://schemas.openxmlformats.org/drawingml/2006/main" xmlns:r="http://schemas.openxmlformats.org/officeDocument/2006/relationships" xmlns:p1510="http://schemas.microsoft.com/office/powerpoint/2015/10/main"/>
-</file>
-
 <file path=ppt/changesInfos/changesInfo1.xml><?xml version="1.0" encoding="utf-8"?>
 <pc:chgInfo xmlns:a="http://schemas.openxmlformats.org/drawingml/2006/main" xmlns:r="http://schemas.openxmlformats.org/officeDocument/2006/relationships" xmlns:ac="http://schemas.microsoft.com/office/drawing/2013/main/command" xmlns:pc="http://schemas.microsoft.com/office/powerpoint/2013/main/command">
   <pc:docChgLst>
     <pc:chgData name="김윤겸" userId="e4af893241f1c67e" providerId="LiveId" clId="{0D806EF5-75AB-4BD7-B434-3714CC0F41D9}"/>
     <pc:docChg chg="undo custSel addSld delSld modSld sldOrd">
-      <pc:chgData name="김윤겸" userId="e4af893241f1c67e" providerId="LiveId" clId="{0D806EF5-75AB-4BD7-B434-3714CC0F41D9}" dt="2017-09-07T11:48:58.057" v="3670" actId="20577"/>
+      <pc:chgData name="김윤겸" userId="e4af893241f1c67e" providerId="LiveId" clId="{0D806EF5-75AB-4BD7-B434-3714CC0F41D9}" dt="2017-09-18T06:39:34.219" v="5718" actId="20577"/>
       <pc:docMkLst>
         <pc:docMk/>
       </pc:docMkLst>
@@ -293,7 +291,7 @@
         </pc:spChg>
       </pc:sldChg>
       <pc:sldChg chg="modSp add">
-        <pc:chgData name="김윤겸" userId="e4af893241f1c67e" providerId="LiveId" clId="{0D806EF5-75AB-4BD7-B434-3714CC0F41D9}" dt="2017-09-07T11:12:03.097" v="1555" actId="1076"/>
+        <pc:chgData name="김윤겸" userId="e4af893241f1c67e" providerId="LiveId" clId="{0D806EF5-75AB-4BD7-B434-3714CC0F41D9}" dt="2017-09-18T06:25:07.048" v="4032" actId="20577"/>
         <pc:sldMkLst>
           <pc:docMk/>
           <pc:sldMk cId="3261240586" sldId="268"/>
@@ -307,7 +305,7 @@
           </ac:spMkLst>
         </pc:spChg>
         <pc:spChg chg="mod">
-          <ac:chgData name="김윤겸" userId="e4af893241f1c67e" providerId="LiveId" clId="{0D806EF5-75AB-4BD7-B434-3714CC0F41D9}" dt="2017-09-07T10:44:19.233" v="957" actId="20577"/>
+          <ac:chgData name="김윤겸" userId="e4af893241f1c67e" providerId="LiveId" clId="{0D806EF5-75AB-4BD7-B434-3714CC0F41D9}" dt="2017-09-18T06:25:07.048" v="4032" actId="20577"/>
           <ac:spMkLst>
             <pc:docMk/>
             <pc:sldMk cId="3261240586" sldId="268"/>
@@ -332,7 +330,7 @@
         </pc:spChg>
       </pc:sldChg>
       <pc:sldChg chg="modSp add">
-        <pc:chgData name="김윤겸" userId="e4af893241f1c67e" providerId="LiveId" clId="{0D806EF5-75AB-4BD7-B434-3714CC0F41D9}" dt="2017-09-07T11:22:56.838" v="2091" actId="20577"/>
+        <pc:chgData name="김윤겸" userId="e4af893241f1c67e" providerId="LiveId" clId="{0D806EF5-75AB-4BD7-B434-3714CC0F41D9}" dt="2017-09-18T06:21:52.219" v="3735" actId="20577"/>
         <pc:sldMkLst>
           <pc:docMk/>
           <pc:sldMk cId="4052645052" sldId="269"/>
@@ -346,7 +344,7 @@
           </ac:spMkLst>
         </pc:spChg>
         <pc:spChg chg="mod">
-          <ac:chgData name="김윤겸" userId="e4af893241f1c67e" providerId="LiveId" clId="{0D806EF5-75AB-4BD7-B434-3714CC0F41D9}" dt="2017-09-07T10:57:04.291" v="1011" actId="20577"/>
+          <ac:chgData name="김윤겸" userId="e4af893241f1c67e" providerId="LiveId" clId="{0D806EF5-75AB-4BD7-B434-3714CC0F41D9}" dt="2017-09-18T06:21:52.219" v="3735" actId="20577"/>
           <ac:spMkLst>
             <pc:docMk/>
             <pc:sldMk cId="4052645052" sldId="269"/>
@@ -371,7 +369,7 @@
         </pc:spChg>
       </pc:sldChg>
       <pc:sldChg chg="modSp add">
-        <pc:chgData name="김윤겸" userId="e4af893241f1c67e" providerId="LiveId" clId="{0D806EF5-75AB-4BD7-B434-3714CC0F41D9}" dt="2017-09-07T11:21:56.447" v="1944" actId="20577"/>
+        <pc:chgData name="김윤겸" userId="e4af893241f1c67e" providerId="LiveId" clId="{0D806EF5-75AB-4BD7-B434-3714CC0F41D9}" dt="2017-09-18T06:23:25.739" v="3863" actId="20577"/>
         <pc:sldMkLst>
           <pc:docMk/>
           <pc:sldMk cId="1620574207" sldId="270"/>
@@ -385,7 +383,7 @@
           </ac:spMkLst>
         </pc:spChg>
         <pc:spChg chg="mod">
-          <ac:chgData name="김윤겸" userId="e4af893241f1c67e" providerId="LiveId" clId="{0D806EF5-75AB-4BD7-B434-3714CC0F41D9}" dt="2017-09-07T10:57:06.277" v="1012" actId="20577"/>
+          <ac:chgData name="김윤겸" userId="e4af893241f1c67e" providerId="LiveId" clId="{0D806EF5-75AB-4BD7-B434-3714CC0F41D9}" dt="2017-09-18T06:23:25.739" v="3863" actId="20577"/>
           <ac:spMkLst>
             <pc:docMk/>
             <pc:sldMk cId="1620574207" sldId="270"/>
@@ -410,7 +408,7 @@
         </pc:spChg>
       </pc:sldChg>
       <pc:sldChg chg="modSp add">
-        <pc:chgData name="김윤겸" userId="e4af893241f1c67e" providerId="LiveId" clId="{0D806EF5-75AB-4BD7-B434-3714CC0F41D9}" dt="2017-09-07T11:28:06.444" v="2094" actId="1076"/>
+        <pc:chgData name="김윤겸" userId="e4af893241f1c67e" providerId="LiveId" clId="{0D806EF5-75AB-4BD7-B434-3714CC0F41D9}" dt="2017-09-18T06:26:39.338" v="4091" actId="20577"/>
         <pc:sldMkLst>
           <pc:docMk/>
           <pc:sldMk cId="1796875348" sldId="271"/>
@@ -424,7 +422,7 @@
           </ac:spMkLst>
         </pc:spChg>
         <pc:spChg chg="mod">
-          <ac:chgData name="김윤겸" userId="e4af893241f1c67e" providerId="LiveId" clId="{0D806EF5-75AB-4BD7-B434-3714CC0F41D9}" dt="2017-09-07T10:57:07.406" v="1013" actId="20577"/>
+          <ac:chgData name="김윤겸" userId="e4af893241f1c67e" providerId="LiveId" clId="{0D806EF5-75AB-4BD7-B434-3714CC0F41D9}" dt="2017-09-18T06:26:39.338" v="4091" actId="20577"/>
           <ac:spMkLst>
             <pc:docMk/>
             <pc:sldMk cId="1796875348" sldId="271"/>
@@ -449,7 +447,7 @@
         </pc:spChg>
       </pc:sldChg>
       <pc:sldChg chg="modSp add">
-        <pc:chgData name="김윤겸" userId="e4af893241f1c67e" providerId="LiveId" clId="{0D806EF5-75AB-4BD7-B434-3714CC0F41D9}" dt="2017-09-07T11:33:38.070" v="2261" actId="20577"/>
+        <pc:chgData name="김윤겸" userId="e4af893241f1c67e" providerId="LiveId" clId="{0D806EF5-75AB-4BD7-B434-3714CC0F41D9}" dt="2017-09-18T06:27:10.128" v="4140" actId="20577"/>
         <pc:sldMkLst>
           <pc:docMk/>
           <pc:sldMk cId="276816726" sldId="272"/>
@@ -463,7 +461,7 @@
           </ac:spMkLst>
         </pc:spChg>
         <pc:spChg chg="mod">
-          <ac:chgData name="김윤겸" userId="e4af893241f1c67e" providerId="LiveId" clId="{0D806EF5-75AB-4BD7-B434-3714CC0F41D9}" dt="2017-09-07T10:57:08.742" v="1014" actId="20577"/>
+          <ac:chgData name="김윤겸" userId="e4af893241f1c67e" providerId="LiveId" clId="{0D806EF5-75AB-4BD7-B434-3714CC0F41D9}" dt="2017-09-18T06:27:10.128" v="4140" actId="20577"/>
           <ac:spMkLst>
             <pc:docMk/>
             <pc:sldMk cId="276816726" sldId="272"/>
@@ -488,7 +486,7 @@
         </pc:spChg>
       </pc:sldChg>
       <pc:sldChg chg="modSp add">
-        <pc:chgData name="김윤겸" userId="e4af893241f1c67e" providerId="LiveId" clId="{0D806EF5-75AB-4BD7-B434-3714CC0F41D9}" dt="2017-09-07T11:34:17.656" v="2364" actId="20577"/>
+        <pc:chgData name="김윤겸" userId="e4af893241f1c67e" providerId="LiveId" clId="{0D806EF5-75AB-4BD7-B434-3714CC0F41D9}" dt="2017-09-18T06:27:35.327" v="4202" actId="20577"/>
         <pc:sldMkLst>
           <pc:docMk/>
           <pc:sldMk cId="3834474679" sldId="273"/>
@@ -502,7 +500,7 @@
           </ac:spMkLst>
         </pc:spChg>
         <pc:spChg chg="mod">
-          <ac:chgData name="김윤겸" userId="e4af893241f1c67e" providerId="LiveId" clId="{0D806EF5-75AB-4BD7-B434-3714CC0F41D9}" dt="2017-09-07T10:57:10.186" v="1015" actId="20577"/>
+          <ac:chgData name="김윤겸" userId="e4af893241f1c67e" providerId="LiveId" clId="{0D806EF5-75AB-4BD7-B434-3714CC0F41D9}" dt="2017-09-18T06:27:35.327" v="4202" actId="20577"/>
           <ac:spMkLst>
             <pc:docMk/>
             <pc:sldMk cId="3834474679" sldId="273"/>
@@ -519,7 +517,7 @@
         </pc:spChg>
       </pc:sldChg>
       <pc:sldChg chg="modSp add ord">
-        <pc:chgData name="김윤겸" userId="e4af893241f1c67e" providerId="LiveId" clId="{0D806EF5-75AB-4BD7-B434-3714CC0F41D9}" dt="2017-09-07T11:36:32.558" v="2558" actId="20577"/>
+        <pc:chgData name="김윤겸" userId="e4af893241f1c67e" providerId="LiveId" clId="{0D806EF5-75AB-4BD7-B434-3714CC0F41D9}" dt="2017-09-18T06:28:09.301" v="4289" actId="20577"/>
         <pc:sldMkLst>
           <pc:docMk/>
           <pc:sldMk cId="3360574575" sldId="274"/>
@@ -533,7 +531,7 @@
           </ac:spMkLst>
         </pc:spChg>
         <pc:spChg chg="mod">
-          <ac:chgData name="김윤겸" userId="e4af893241f1c67e" providerId="LiveId" clId="{0D806EF5-75AB-4BD7-B434-3714CC0F41D9}" dt="2017-09-07T10:57:11.837" v="1016" actId="20577"/>
+          <ac:chgData name="김윤겸" userId="e4af893241f1c67e" providerId="LiveId" clId="{0D806EF5-75AB-4BD7-B434-3714CC0F41D9}" dt="2017-09-18T06:28:09.301" v="4289" actId="20577"/>
           <ac:spMkLst>
             <pc:docMk/>
             <pc:sldMk cId="3360574575" sldId="274"/>
@@ -558,7 +556,7 @@
         </pc:spChg>
       </pc:sldChg>
       <pc:sldChg chg="modSp add">
-        <pc:chgData name="김윤겸" userId="e4af893241f1c67e" providerId="LiveId" clId="{0D806EF5-75AB-4BD7-B434-3714CC0F41D9}" dt="2017-09-07T11:40:47.186" v="2849" actId="20577"/>
+        <pc:chgData name="김윤겸" userId="e4af893241f1c67e" providerId="LiveId" clId="{0D806EF5-75AB-4BD7-B434-3714CC0F41D9}" dt="2017-09-18T06:32:32.070" v="4836" actId="20577"/>
         <pc:sldMkLst>
           <pc:docMk/>
           <pc:sldMk cId="2080687648" sldId="275"/>
@@ -572,7 +570,7 @@
           </ac:spMkLst>
         </pc:spChg>
         <pc:spChg chg="mod">
-          <ac:chgData name="김윤겸" userId="e4af893241f1c67e" providerId="LiveId" clId="{0D806EF5-75AB-4BD7-B434-3714CC0F41D9}" dt="2017-09-07T10:57:13.298" v="1017" actId="20577"/>
+          <ac:chgData name="김윤겸" userId="e4af893241f1c67e" providerId="LiveId" clId="{0D806EF5-75AB-4BD7-B434-3714CC0F41D9}" dt="2017-09-18T06:32:32.070" v="4836" actId="20577"/>
           <ac:spMkLst>
             <pc:docMk/>
             <pc:sldMk cId="2080687648" sldId="275"/>
@@ -597,7 +595,7 @@
         </pc:spChg>
       </pc:sldChg>
       <pc:sldChg chg="modSp add">
-        <pc:chgData name="김윤겸" userId="e4af893241f1c67e" providerId="LiveId" clId="{0D806EF5-75AB-4BD7-B434-3714CC0F41D9}" dt="2017-09-07T11:46:14.513" v="3303" actId="20577"/>
+        <pc:chgData name="김윤겸" userId="e4af893241f1c67e" providerId="LiveId" clId="{0D806EF5-75AB-4BD7-B434-3714CC0F41D9}" dt="2017-09-18T06:29:40.278" v="4557" actId="20577"/>
         <pc:sldMkLst>
           <pc:docMk/>
           <pc:sldMk cId="342639669" sldId="276"/>
@@ -611,7 +609,7 @@
           </ac:spMkLst>
         </pc:spChg>
         <pc:spChg chg="mod">
-          <ac:chgData name="김윤겸" userId="e4af893241f1c67e" providerId="LiveId" clId="{0D806EF5-75AB-4BD7-B434-3714CC0F41D9}" dt="2017-09-07T10:57:14.983" v="1018" actId="20577"/>
+          <ac:chgData name="김윤겸" userId="e4af893241f1c67e" providerId="LiveId" clId="{0D806EF5-75AB-4BD7-B434-3714CC0F41D9}" dt="2017-09-18T06:29:40.278" v="4557" actId="20577"/>
           <ac:spMkLst>
             <pc:docMk/>
             <pc:sldMk cId="342639669" sldId="276"/>
@@ -636,7 +634,7 @@
         </pc:spChg>
       </pc:sldChg>
       <pc:sldChg chg="modSp add">
-        <pc:chgData name="김윤겸" userId="e4af893241f1c67e" providerId="LiveId" clId="{0D806EF5-75AB-4BD7-B434-3714CC0F41D9}" dt="2017-09-07T11:47:38.729" v="3457" actId="20577"/>
+        <pc:chgData name="김윤겸" userId="e4af893241f1c67e" providerId="LiveId" clId="{0D806EF5-75AB-4BD7-B434-3714CC0F41D9}" dt="2017-09-18T06:34:57.454" v="4900" actId="20577"/>
         <pc:sldMkLst>
           <pc:docMk/>
           <pc:sldMk cId="344383312" sldId="277"/>
@@ -650,7 +648,7 @@
           </ac:spMkLst>
         </pc:spChg>
         <pc:spChg chg="mod">
-          <ac:chgData name="김윤겸" userId="e4af893241f1c67e" providerId="LiveId" clId="{0D806EF5-75AB-4BD7-B434-3714CC0F41D9}" dt="2017-09-07T10:57:16.800" v="1019" actId="20577"/>
+          <ac:chgData name="김윤겸" userId="e4af893241f1c67e" providerId="LiveId" clId="{0D806EF5-75AB-4BD7-B434-3714CC0F41D9}" dt="2017-09-18T06:34:57.454" v="4900" actId="20577"/>
           <ac:spMkLst>
             <pc:docMk/>
             <pc:sldMk cId="344383312" sldId="277"/>
@@ -675,7 +673,7 @@
         </pc:spChg>
       </pc:sldChg>
       <pc:sldChg chg="modSp add">
-        <pc:chgData name="김윤겸" userId="e4af893241f1c67e" providerId="LiveId" clId="{0D806EF5-75AB-4BD7-B434-3714CC0F41D9}" dt="2017-09-07T11:48:58.057" v="3670" actId="20577"/>
+        <pc:chgData name="김윤겸" userId="e4af893241f1c67e" providerId="LiveId" clId="{0D806EF5-75AB-4BD7-B434-3714CC0F41D9}" dt="2017-09-18T06:32:06.664" v="4826" actId="20577"/>
         <pc:sldMkLst>
           <pc:docMk/>
           <pc:sldMk cId="3161105411" sldId="278"/>
@@ -689,7 +687,7 @@
           </ac:spMkLst>
         </pc:spChg>
         <pc:spChg chg="mod">
-          <ac:chgData name="김윤겸" userId="e4af893241f1c67e" providerId="LiveId" clId="{0D806EF5-75AB-4BD7-B434-3714CC0F41D9}" dt="2017-09-07T10:57:18.415" v="1020" actId="20577"/>
+          <ac:chgData name="김윤겸" userId="e4af893241f1c67e" providerId="LiveId" clId="{0D806EF5-75AB-4BD7-B434-3714CC0F41D9}" dt="2017-09-18T06:30:32.032" v="4611" actId="20577"/>
           <ac:spMkLst>
             <pc:docMk/>
             <pc:sldMk cId="3161105411" sldId="278"/>
@@ -705,7 +703,7 @@
           </ac:spMkLst>
         </pc:spChg>
         <pc:spChg chg="mod">
-          <ac:chgData name="김윤겸" userId="e4af893241f1c67e" providerId="LiveId" clId="{0D806EF5-75AB-4BD7-B434-3714CC0F41D9}" dt="2017-09-07T11:48:58.057" v="3670" actId="20577"/>
+          <ac:chgData name="김윤겸" userId="e4af893241f1c67e" providerId="LiveId" clId="{0D806EF5-75AB-4BD7-B434-3714CC0F41D9}" dt="2017-09-18T06:32:06.664" v="4826" actId="20577"/>
           <ac:spMkLst>
             <pc:docMk/>
             <pc:sldMk cId="3161105411" sldId="278"/>
@@ -714,7 +712,7 @@
         </pc:spChg>
       </pc:sldChg>
       <pc:sldChg chg="modSp add">
-        <pc:chgData name="김윤겸" userId="e4af893241f1c67e" providerId="LiveId" clId="{0D806EF5-75AB-4BD7-B434-3714CC0F41D9}" dt="2017-09-07T11:39:46.072" v="2661" actId="20577"/>
+        <pc:chgData name="김윤겸" userId="e4af893241f1c67e" providerId="LiveId" clId="{0D806EF5-75AB-4BD7-B434-3714CC0F41D9}" dt="2017-09-18T06:28:50.203" v="4383" actId="20577"/>
         <pc:sldMkLst>
           <pc:docMk/>
           <pc:sldMk cId="35284914" sldId="279"/>
@@ -728,7 +726,7 @@
           </ac:spMkLst>
         </pc:spChg>
         <pc:spChg chg="mod">
-          <ac:chgData name="김윤겸" userId="e4af893241f1c67e" providerId="LiveId" clId="{0D806EF5-75AB-4BD7-B434-3714CC0F41D9}" dt="2017-09-07T11:06:47.558" v="1403" actId="20577"/>
+          <ac:chgData name="김윤겸" userId="e4af893241f1c67e" providerId="LiveId" clId="{0D806EF5-75AB-4BD7-B434-3714CC0F41D9}" dt="2017-09-18T06:28:50.203" v="4383" actId="20577"/>
           <ac:spMkLst>
             <pc:docMk/>
             <pc:sldMk cId="35284914" sldId="279"/>
@@ -748,6 +746,91 @@
           <ac:spMkLst>
             <pc:docMk/>
             <pc:sldMk cId="35284914" sldId="279"/>
+            <ac:spMk id="13" creationId="{00000000-0000-0000-0000-000000000000}"/>
+          </ac:spMkLst>
+        </pc:spChg>
+      </pc:sldChg>
+      <pc:sldChg chg="add del">
+        <pc:chgData name="김윤겸" userId="e4af893241f1c67e" providerId="LiveId" clId="{0D806EF5-75AB-4BD7-B434-3714CC0F41D9}" dt="2017-09-18T06:31:15.780" v="4676"/>
+        <pc:sldMkLst>
+          <pc:docMk/>
+          <pc:sldMk cId="2199744337" sldId="280"/>
+        </pc:sldMkLst>
+      </pc:sldChg>
+      <pc:sldChg chg="modSp add">
+        <pc:chgData name="김윤겸" userId="e4af893241f1c67e" providerId="LiveId" clId="{0D806EF5-75AB-4BD7-B434-3714CC0F41D9}" dt="2017-09-18T06:37:21.711" v="5287" actId="20577"/>
+        <pc:sldMkLst>
+          <pc:docMk/>
+          <pc:sldMk cId="3445007689" sldId="280"/>
+        </pc:sldMkLst>
+        <pc:spChg chg="mod">
+          <ac:chgData name="김윤겸" userId="e4af893241f1c67e" providerId="LiveId" clId="{0D806EF5-75AB-4BD7-B434-3714CC0F41D9}" dt="2017-09-18T06:36:07.307" v="5066" actId="20577"/>
+          <ac:spMkLst>
+            <pc:docMk/>
+            <pc:sldMk cId="3445007689" sldId="280"/>
+            <ac:spMk id="6" creationId="{00000000-0000-0000-0000-000000000000}"/>
+          </ac:spMkLst>
+        </pc:spChg>
+        <pc:spChg chg="mod">
+          <ac:chgData name="김윤겸" userId="e4af893241f1c67e" providerId="LiveId" clId="{0D806EF5-75AB-4BD7-B434-3714CC0F41D9}" dt="2017-09-18T06:36:22.235" v="5131" actId="20577"/>
+          <ac:spMkLst>
+            <pc:docMk/>
+            <pc:sldMk cId="3445007689" sldId="280"/>
+            <ac:spMk id="7" creationId="{00000000-0000-0000-0000-000000000000}"/>
+          </ac:spMkLst>
+        </pc:spChg>
+        <pc:spChg chg="mod">
+          <ac:chgData name="김윤겸" userId="e4af893241f1c67e" providerId="LiveId" clId="{0D806EF5-75AB-4BD7-B434-3714CC0F41D9}" dt="2017-09-18T06:36:34.948" v="5152" actId="20577"/>
+          <ac:spMkLst>
+            <pc:docMk/>
+            <pc:sldMk cId="3445007689" sldId="280"/>
+            <ac:spMk id="8" creationId="{00000000-0000-0000-0000-000000000000}"/>
+          </ac:spMkLst>
+        </pc:spChg>
+        <pc:spChg chg="mod">
+          <ac:chgData name="김윤겸" userId="e4af893241f1c67e" providerId="LiveId" clId="{0D806EF5-75AB-4BD7-B434-3714CC0F41D9}" dt="2017-09-18T06:37:21.711" v="5287" actId="20577"/>
+          <ac:spMkLst>
+            <pc:docMk/>
+            <pc:sldMk cId="3445007689" sldId="280"/>
+            <ac:spMk id="13" creationId="{00000000-0000-0000-0000-000000000000}"/>
+          </ac:spMkLst>
+        </pc:spChg>
+      </pc:sldChg>
+      <pc:sldChg chg="modSp add">
+        <pc:chgData name="김윤겸" userId="e4af893241f1c67e" providerId="LiveId" clId="{0D806EF5-75AB-4BD7-B434-3714CC0F41D9}" dt="2017-09-18T06:39:34.219" v="5718" actId="20577"/>
+        <pc:sldMkLst>
+          <pc:docMk/>
+          <pc:sldMk cId="831793290" sldId="281"/>
+        </pc:sldMkLst>
+        <pc:spChg chg="mod">
+          <ac:chgData name="김윤겸" userId="e4af893241f1c67e" providerId="LiveId" clId="{0D806EF5-75AB-4BD7-B434-3714CC0F41D9}" dt="2017-09-18T06:37:30.260" v="5297" actId="20577"/>
+          <ac:spMkLst>
+            <pc:docMk/>
+            <pc:sldMk cId="831793290" sldId="281"/>
+            <ac:spMk id="6" creationId="{00000000-0000-0000-0000-000000000000}"/>
+          </ac:spMkLst>
+        </pc:spChg>
+        <pc:spChg chg="mod">
+          <ac:chgData name="김윤겸" userId="e4af893241f1c67e" providerId="LiveId" clId="{0D806EF5-75AB-4BD7-B434-3714CC0F41D9}" dt="2017-09-18T06:38:34.783" v="5529" actId="20577"/>
+          <ac:spMkLst>
+            <pc:docMk/>
+            <pc:sldMk cId="831793290" sldId="281"/>
+            <ac:spMk id="7" creationId="{00000000-0000-0000-0000-000000000000}"/>
+          </ac:spMkLst>
+        </pc:spChg>
+        <pc:spChg chg="mod">
+          <ac:chgData name="김윤겸" userId="e4af893241f1c67e" providerId="LiveId" clId="{0D806EF5-75AB-4BD7-B434-3714CC0F41D9}" dt="2017-09-18T06:38:45.243" v="5560" actId="20577"/>
+          <ac:spMkLst>
+            <pc:docMk/>
+            <pc:sldMk cId="831793290" sldId="281"/>
+            <ac:spMk id="8" creationId="{00000000-0000-0000-0000-000000000000}"/>
+          </ac:spMkLst>
+        </pc:spChg>
+        <pc:spChg chg="mod">
+          <ac:chgData name="김윤겸" userId="e4af893241f1c67e" providerId="LiveId" clId="{0D806EF5-75AB-4BD7-B434-3714CC0F41D9}" dt="2017-09-18T06:39:34.219" v="5718" actId="20577"/>
+          <ac:spMkLst>
+            <pc:docMk/>
+            <pc:sldMk cId="831793290" sldId="281"/>
             <ac:spMk id="13" creationId="{00000000-0000-0000-0000-000000000000}"/>
           </ac:spMkLst>
         </pc:spChg>
@@ -888,7 +971,7 @@
           <a:p>
             <a:fld id="{5B4268EA-73F9-4955-9E64-2FD477901B09}" type="datetimeFigureOut">
               <a:rPr lang="en-AU" smtClean="0"/>
-              <a:t>7/09/2017</a:t>
+              <a:t>18/09/2017</a:t>
             </a:fld>
             <a:endParaRPr lang="en-AU"/>
           </a:p>
@@ -1058,7 +1141,7 @@
           <a:p>
             <a:fld id="{5B4268EA-73F9-4955-9E64-2FD477901B09}" type="datetimeFigureOut">
               <a:rPr lang="en-AU" smtClean="0"/>
-              <a:t>7/09/2017</a:t>
+              <a:t>18/09/2017</a:t>
             </a:fld>
             <a:endParaRPr lang="en-AU"/>
           </a:p>
@@ -1238,7 +1321,7 @@
           <a:p>
             <a:fld id="{5B4268EA-73F9-4955-9E64-2FD477901B09}" type="datetimeFigureOut">
               <a:rPr lang="en-AU" smtClean="0"/>
-              <a:t>7/09/2017</a:t>
+              <a:t>18/09/2017</a:t>
             </a:fld>
             <a:endParaRPr lang="en-AU"/>
           </a:p>
@@ -1408,7 +1491,7 @@
           <a:p>
             <a:fld id="{5B4268EA-73F9-4955-9E64-2FD477901B09}" type="datetimeFigureOut">
               <a:rPr lang="en-AU" smtClean="0"/>
-              <a:t>7/09/2017</a:t>
+              <a:t>18/09/2017</a:t>
             </a:fld>
             <a:endParaRPr lang="en-AU"/>
           </a:p>
@@ -1654,7 +1737,7 @@
           <a:p>
             <a:fld id="{5B4268EA-73F9-4955-9E64-2FD477901B09}" type="datetimeFigureOut">
               <a:rPr lang="en-AU" smtClean="0"/>
-              <a:t>7/09/2017</a:t>
+              <a:t>18/09/2017</a:t>
             </a:fld>
             <a:endParaRPr lang="en-AU"/>
           </a:p>
@@ -1886,7 +1969,7 @@
           <a:p>
             <a:fld id="{5B4268EA-73F9-4955-9E64-2FD477901B09}" type="datetimeFigureOut">
               <a:rPr lang="en-AU" smtClean="0"/>
-              <a:t>7/09/2017</a:t>
+              <a:t>18/09/2017</a:t>
             </a:fld>
             <a:endParaRPr lang="en-AU"/>
           </a:p>
@@ -2253,7 +2336,7 @@
           <a:p>
             <a:fld id="{5B4268EA-73F9-4955-9E64-2FD477901B09}" type="datetimeFigureOut">
               <a:rPr lang="en-AU" smtClean="0"/>
-              <a:t>7/09/2017</a:t>
+              <a:t>18/09/2017</a:t>
             </a:fld>
             <a:endParaRPr lang="en-AU"/>
           </a:p>
@@ -2371,7 +2454,7 @@
           <a:p>
             <a:fld id="{5B4268EA-73F9-4955-9E64-2FD477901B09}" type="datetimeFigureOut">
               <a:rPr lang="en-AU" smtClean="0"/>
-              <a:t>7/09/2017</a:t>
+              <a:t>18/09/2017</a:t>
             </a:fld>
             <a:endParaRPr lang="en-AU"/>
           </a:p>
@@ -2466,7 +2549,7 @@
           <a:p>
             <a:fld id="{5B4268EA-73F9-4955-9E64-2FD477901B09}" type="datetimeFigureOut">
               <a:rPr lang="en-AU" smtClean="0"/>
-              <a:t>7/09/2017</a:t>
+              <a:t>18/09/2017</a:t>
             </a:fld>
             <a:endParaRPr lang="en-AU"/>
           </a:p>
@@ -2743,7 +2826,7 @@
           <a:p>
             <a:fld id="{5B4268EA-73F9-4955-9E64-2FD477901B09}" type="datetimeFigureOut">
               <a:rPr lang="en-AU" smtClean="0"/>
-              <a:t>7/09/2017</a:t>
+              <a:t>18/09/2017</a:t>
             </a:fld>
             <a:endParaRPr lang="en-AU"/>
           </a:p>
@@ -2996,7 +3079,7 @@
           <a:p>
             <a:fld id="{5B4268EA-73F9-4955-9E64-2FD477901B09}" type="datetimeFigureOut">
               <a:rPr lang="en-AU" smtClean="0"/>
-              <a:t>7/09/2017</a:t>
+              <a:t>18/09/2017</a:t>
             </a:fld>
             <a:endParaRPr lang="en-AU"/>
           </a:p>
@@ -3209,7 +3292,7 @@
           <a:p>
             <a:fld id="{5B4268EA-73F9-4955-9E64-2FD477901B09}" type="datetimeFigureOut">
               <a:rPr lang="en-AU" smtClean="0"/>
-              <a:t>7/09/2017</a:t>
+              <a:t>18/09/2017</a:t>
             </a:fld>
             <a:endParaRPr lang="en-AU"/>
           </a:p>
@@ -3778,23 +3861,7 @@
                   <a:schemeClr val="tx1"/>
                 </a:solidFill>
               </a:rPr>
-              <a:t>As the </a:t>
-            </a:r>
-            <a:r>
-              <a:rPr lang="en-US" sz="2400" dirty="0">
-                <a:solidFill>
-                  <a:schemeClr val="tx1"/>
-                </a:solidFill>
-              </a:rPr>
-              <a:t>tutor</a:t>
-            </a:r>
-            <a:r>
-              <a:rPr lang="en-AU" sz="2400" dirty="0">
-                <a:solidFill>
-                  <a:schemeClr val="tx1"/>
-                </a:solidFill>
-              </a:rPr>
-              <a:t>, I want to be able to see student details</a:t>
+              <a:t>As the unit coordinator, I want to be able to see student details so that I can see if there is an issue with student details</a:t>
             </a:r>
           </a:p>
         </p:txBody>
@@ -4266,7 +4333,7 @@
                   <a:schemeClr val="tx1"/>
                 </a:solidFill>
               </a:rPr>
-              <a:t>As the unit coordinator, I want to be able to assign projects for teams</a:t>
+              <a:t>As the unit coordinator, I want to be able to assign projects for teams so that the teams who did not get a project assigned can work on backup projects</a:t>
             </a:r>
             <a:endParaRPr lang="ko-KR" altLang="en-US" sz="2400" dirty="0">
               <a:solidFill>
@@ -4750,15 +4817,8 @@
                   <a:schemeClr val="tx1"/>
                 </a:solidFill>
               </a:rPr>
-              <a:t>As the unit coordinator, I want to be able to see fortnightly reflection reports and mark them</a:t>
-            </a:r>
-            <a:endParaRPr lang="en-AU" altLang="ko-KR" sz="2400" dirty="0">
-              <a:solidFill>
-                <a:schemeClr val="tx1"/>
-              </a:solidFill>
-            </a:endParaRPr>
-          </a:p>
-          <a:p>
+              <a:t>As the unit coordinator, I want to be able to see fortnightly reflection reports so that I know which teams are on track and which team are not</a:t>
+            </a:r>
             <a:endParaRPr lang="en-AU" sz="2400" dirty="0">
               <a:solidFill>
                 <a:schemeClr val="tx1"/>
@@ -5234,7 +5294,7 @@
                   <a:schemeClr val="tx1"/>
                 </a:solidFill>
               </a:rPr>
-              <a:t>As the unit coordinator, I want to be able to mark groups/individuals for different assessment</a:t>
+              <a:t>As the unit coordinator, I want to be able to mark groups/individuals for different assessment so that the marks can be released later</a:t>
             </a:r>
             <a:endParaRPr lang="ko-KR" altLang="en-US" sz="2400" dirty="0">
               <a:solidFill>
@@ -5519,23 +5579,21 @@
                   <a:schemeClr val="tx1"/>
                 </a:solidFill>
               </a:rPr>
-              <a:t> Might be better </a:t>
-            </a:r>
-            <a:r>
-              <a:rPr lang="en-AU" sz="2000">
-                <a:solidFill>
-                  <a:schemeClr val="tx1"/>
-                </a:solidFill>
-              </a:rPr>
-              <a:t>to just generate an </a:t>
-            </a:r>
-            <a:r>
-              <a:rPr lang="en-AU" sz="2000" dirty="0">
-                <a:solidFill>
-                  <a:schemeClr val="tx1"/>
-                </a:solidFill>
-              </a:rPr>
-              <a:t>excel file because the coordinator/tutor should post the result on the blackboard anyway</a:t>
+              <a:t> Marks will be released later at the coordinators discretion</a:t>
+            </a:r>
+          </a:p>
+          <a:p>
+            <a:pPr marL="179388" indent="-179388">
+              <a:buFont typeface="Arial" pitchFamily="34" charset="0"/>
+              <a:buChar char="•"/>
+            </a:pPr>
+            <a:r>
+              <a:rPr lang="en-AU" sz="2000" dirty="0">
+                <a:solidFill>
+                  <a:schemeClr val="tx1"/>
+                </a:solidFill>
+              </a:rPr>
+              <a:t>Tutors should be able to do the same, but only the coordinator gets to decide whether and when to release the marks</a:t>
             </a:r>
           </a:p>
         </p:txBody>
@@ -5544,6 +5602,1003 @@
     <p:extLst>
       <p:ext uri="{BB962C8B-B14F-4D97-AF65-F5344CB8AC3E}">
         <p14:creationId xmlns:p14="http://schemas.microsoft.com/office/powerpoint/2010/main" val="3161105411"/>
+      </p:ext>
+    </p:extLst>
+  </p:cSld>
+  <p:clrMapOvr>
+    <a:masterClrMapping/>
+  </p:clrMapOvr>
+</p:sld>
+</file>
+
+<file path=ppt/slides/slide13.xml><?xml version="1.0" encoding="utf-8"?>
+<p:sld xmlns:a="http://schemas.openxmlformats.org/drawingml/2006/main" xmlns:r="http://schemas.openxmlformats.org/officeDocument/2006/relationships" xmlns:p="http://schemas.openxmlformats.org/presentationml/2006/main">
+  <p:cSld>
+    <p:spTree>
+      <p:nvGrpSpPr>
+        <p:cNvPr id="1" name=""/>
+        <p:cNvGrpSpPr/>
+        <p:nvPr/>
+      </p:nvGrpSpPr>
+      <p:grpSpPr>
+        <a:xfrm>
+          <a:off x="0" y="0"/>
+          <a:ext cx="0" cy="0"/>
+          <a:chOff x="0" y="0"/>
+          <a:chExt cx="0" cy="0"/>
+        </a:xfrm>
+      </p:grpSpPr>
+      <p:sp>
+        <p:nvSpPr>
+          <p:cNvPr id="4" name="Rectangle 3"/>
+          <p:cNvSpPr/>
+          <p:nvPr/>
+        </p:nvSpPr>
+        <p:spPr>
+          <a:xfrm>
+            <a:off x="1182153" y="109410"/>
+            <a:ext cx="720000" cy="540000"/>
+          </a:xfrm>
+          <a:prstGeom prst="rect">
+            <a:avLst/>
+          </a:prstGeom>
+          <a:solidFill>
+            <a:schemeClr val="accent1">
+              <a:lumMod val="40000"/>
+              <a:lumOff val="60000"/>
+            </a:schemeClr>
+          </a:solidFill>
+          <a:ln>
+            <a:solidFill>
+              <a:schemeClr val="accent1">
+                <a:lumMod val="50000"/>
+              </a:schemeClr>
+            </a:solidFill>
+          </a:ln>
+        </p:spPr>
+        <p:style>
+          <a:lnRef idx="2">
+            <a:schemeClr val="accent1">
+              <a:shade val="50000"/>
+            </a:schemeClr>
+          </a:lnRef>
+          <a:fillRef idx="1">
+            <a:schemeClr val="accent1"/>
+          </a:fillRef>
+          <a:effectRef idx="0">
+            <a:schemeClr val="accent1"/>
+          </a:effectRef>
+          <a:fontRef idx="minor">
+            <a:schemeClr val="lt1"/>
+          </a:fontRef>
+        </p:style>
+        <p:txBody>
+          <a:bodyPr wrap="square" lIns="0" rIns="0" rtlCol="0" anchor="ctr"/>
+          <a:lstStyle/>
+          <a:p>
+            <a:pPr algn="ctr"/>
+            <a:r>
+              <a:rPr lang="en-AU" sz="2000" dirty="0">
+                <a:solidFill>
+                  <a:schemeClr val="tx1"/>
+                </a:solidFill>
+              </a:rPr>
+              <a:t>Story ID 0</a:t>
+            </a:r>
+          </a:p>
+        </p:txBody>
+      </p:sp>
+      <p:sp>
+        <p:nvSpPr>
+          <p:cNvPr id="6" name="Rectangle 5"/>
+          <p:cNvSpPr/>
+          <p:nvPr/>
+        </p:nvSpPr>
+        <p:spPr>
+          <a:xfrm>
+            <a:off x="1974153" y="109410"/>
+            <a:ext cx="7380000" cy="540000"/>
+          </a:xfrm>
+          <a:prstGeom prst="rect">
+            <a:avLst/>
+          </a:prstGeom>
+          <a:ln>
+            <a:solidFill>
+              <a:schemeClr val="accent1">
+                <a:lumMod val="50000"/>
+              </a:schemeClr>
+            </a:solidFill>
+          </a:ln>
+        </p:spPr>
+        <p:style>
+          <a:lnRef idx="2">
+            <a:schemeClr val="accent1">
+              <a:shade val="50000"/>
+            </a:schemeClr>
+          </a:lnRef>
+          <a:fillRef idx="1">
+            <a:schemeClr val="accent1"/>
+          </a:fillRef>
+          <a:effectRef idx="0">
+            <a:schemeClr val="accent1"/>
+          </a:effectRef>
+          <a:fontRef idx="minor">
+            <a:schemeClr val="lt1"/>
+          </a:fontRef>
+        </p:style>
+        <p:txBody>
+          <a:bodyPr rtlCol="0" anchor="ctr"/>
+          <a:lstStyle/>
+          <a:p>
+            <a:pPr algn="ctr"/>
+            <a:r>
+              <a:rPr lang="en-AU" sz="2800" dirty="0"/>
+              <a:t>Cohorts View/Edit</a:t>
+            </a:r>
+          </a:p>
+        </p:txBody>
+      </p:sp>
+      <p:sp>
+        <p:nvSpPr>
+          <p:cNvPr id="7" name="Rectangle 6"/>
+          <p:cNvSpPr/>
+          <p:nvPr/>
+        </p:nvSpPr>
+        <p:spPr>
+          <a:xfrm>
+            <a:off x="1182153" y="822470"/>
+            <a:ext cx="9828000" cy="2340000"/>
+          </a:xfrm>
+          <a:prstGeom prst="rect">
+            <a:avLst/>
+          </a:prstGeom>
+          <a:solidFill>
+            <a:schemeClr val="tx2">
+              <a:lumMod val="20000"/>
+              <a:lumOff val="80000"/>
+            </a:schemeClr>
+          </a:solidFill>
+          <a:ln>
+            <a:solidFill>
+              <a:schemeClr val="accent1">
+                <a:lumMod val="50000"/>
+              </a:schemeClr>
+            </a:solidFill>
+          </a:ln>
+        </p:spPr>
+        <p:style>
+          <a:lnRef idx="2">
+            <a:schemeClr val="accent1">
+              <a:shade val="50000"/>
+            </a:schemeClr>
+          </a:lnRef>
+          <a:fillRef idx="1">
+            <a:schemeClr val="accent1"/>
+          </a:fillRef>
+          <a:effectRef idx="0">
+            <a:schemeClr val="accent1"/>
+          </a:effectRef>
+          <a:fontRef idx="minor">
+            <a:schemeClr val="lt1"/>
+          </a:fontRef>
+        </p:style>
+        <p:txBody>
+          <a:bodyPr rtlCol="0" anchor="t" anchorCtr="0"/>
+          <a:lstStyle/>
+          <a:p>
+            <a:r>
+              <a:rPr lang="en-US" altLang="ko-KR" sz="2400" dirty="0">
+                <a:solidFill>
+                  <a:schemeClr val="tx1"/>
+                </a:solidFill>
+              </a:rPr>
+              <a:t>As the unit coordinator, I want to be able to view/edit cohorts so that I can see which teams and students are in which cohort </a:t>
+            </a:r>
+            <a:endParaRPr lang="ko-KR" altLang="en-US" sz="2400" dirty="0">
+              <a:solidFill>
+                <a:schemeClr val="tx1"/>
+              </a:solidFill>
+            </a:endParaRPr>
+          </a:p>
+          <a:p>
+            <a:endParaRPr lang="en-AU" sz="2400" dirty="0">
+              <a:solidFill>
+                <a:schemeClr val="tx1"/>
+              </a:solidFill>
+            </a:endParaRPr>
+          </a:p>
+        </p:txBody>
+      </p:sp>
+      <p:sp>
+        <p:nvSpPr>
+          <p:cNvPr id="8" name="Rectangle 7"/>
+          <p:cNvSpPr/>
+          <p:nvPr/>
+        </p:nvSpPr>
+        <p:spPr>
+          <a:xfrm>
+            <a:off x="1182153" y="3335530"/>
+            <a:ext cx="9828000" cy="1620000"/>
+          </a:xfrm>
+          <a:prstGeom prst="rect">
+            <a:avLst/>
+          </a:prstGeom>
+          <a:solidFill>
+            <a:schemeClr val="accent1">
+              <a:lumMod val="20000"/>
+              <a:lumOff val="80000"/>
+            </a:schemeClr>
+          </a:solidFill>
+          <a:ln>
+            <a:solidFill>
+              <a:schemeClr val="accent1">
+                <a:lumMod val="50000"/>
+              </a:schemeClr>
+            </a:solidFill>
+          </a:ln>
+        </p:spPr>
+        <p:style>
+          <a:lnRef idx="2">
+            <a:schemeClr val="accent1">
+              <a:shade val="50000"/>
+            </a:schemeClr>
+          </a:lnRef>
+          <a:fillRef idx="1">
+            <a:schemeClr val="accent1"/>
+          </a:fillRef>
+          <a:effectRef idx="0">
+            <a:schemeClr val="accent1"/>
+          </a:effectRef>
+          <a:fontRef idx="minor">
+            <a:schemeClr val="lt1"/>
+          </a:fontRef>
+        </p:style>
+        <p:txBody>
+          <a:bodyPr tIns="36000" rtlCol="0" anchor="t" anchorCtr="0"/>
+          <a:lstStyle/>
+          <a:p>
+            <a:r>
+              <a:rPr lang="en-AU" sz="2000" dirty="0">
+                <a:solidFill>
+                  <a:schemeClr val="tx1"/>
+                </a:solidFill>
+              </a:rPr>
+              <a:t>Acceptance Criteria</a:t>
+            </a:r>
+          </a:p>
+          <a:p>
+            <a:pPr marL="342900" indent="-342900">
+              <a:buFont typeface="Arial" panose="020B0604020202020204" pitchFamily="34" charset="0"/>
+              <a:buChar char="•"/>
+            </a:pPr>
+            <a:r>
+              <a:rPr lang="en-AU" sz="2000" dirty="0">
+                <a:solidFill>
+                  <a:schemeClr val="tx1"/>
+                </a:solidFill>
+              </a:rPr>
+              <a:t>The unit coordinator should be able to view and edit cohorts</a:t>
+            </a:r>
+          </a:p>
+        </p:txBody>
+      </p:sp>
+      <p:sp>
+        <p:nvSpPr>
+          <p:cNvPr id="11" name="Rectangle 10"/>
+          <p:cNvSpPr/>
+          <p:nvPr/>
+        </p:nvSpPr>
+        <p:spPr>
+          <a:xfrm>
+            <a:off x="10290153" y="109410"/>
+            <a:ext cx="720000" cy="540000"/>
+          </a:xfrm>
+          <a:prstGeom prst="rect">
+            <a:avLst/>
+          </a:prstGeom>
+          <a:solidFill>
+            <a:srgbClr val="CCF0CD">
+              <a:alpha val="20000"/>
+            </a:srgbClr>
+          </a:solidFill>
+          <a:ln>
+            <a:solidFill>
+              <a:schemeClr val="accent1">
+                <a:lumMod val="50000"/>
+              </a:schemeClr>
+            </a:solidFill>
+          </a:ln>
+        </p:spPr>
+        <p:style>
+          <a:lnRef idx="2">
+            <a:schemeClr val="accent1">
+              <a:shade val="50000"/>
+            </a:schemeClr>
+          </a:lnRef>
+          <a:fillRef idx="1">
+            <a:schemeClr val="accent1"/>
+          </a:fillRef>
+          <a:effectRef idx="0">
+            <a:schemeClr val="accent1"/>
+          </a:effectRef>
+          <a:fontRef idx="minor">
+            <a:schemeClr val="lt1"/>
+          </a:fontRef>
+        </p:style>
+        <p:txBody>
+          <a:bodyPr wrap="square" lIns="0" rIns="0" rtlCol="0" anchor="ctr"/>
+          <a:lstStyle/>
+          <a:p>
+            <a:pPr algn="ctr"/>
+            <a:r>
+              <a:rPr lang="en-AU" sz="2000" dirty="0">
+                <a:solidFill>
+                  <a:schemeClr val="tx1"/>
+                </a:solidFill>
+              </a:rPr>
+              <a:t>Story Points</a:t>
+            </a:r>
+          </a:p>
+        </p:txBody>
+      </p:sp>
+      <p:sp>
+        <p:nvSpPr>
+          <p:cNvPr id="12" name="Rectangle 11"/>
+          <p:cNvSpPr/>
+          <p:nvPr/>
+        </p:nvSpPr>
+        <p:spPr>
+          <a:xfrm>
+            <a:off x="9426153" y="109410"/>
+            <a:ext cx="792000" cy="540000"/>
+          </a:xfrm>
+          <a:prstGeom prst="rect">
+            <a:avLst/>
+          </a:prstGeom>
+          <a:solidFill>
+            <a:schemeClr val="accent4">
+              <a:lumMod val="20000"/>
+              <a:lumOff val="80000"/>
+            </a:schemeClr>
+          </a:solidFill>
+          <a:ln>
+            <a:solidFill>
+              <a:schemeClr val="accent1">
+                <a:lumMod val="50000"/>
+              </a:schemeClr>
+            </a:solidFill>
+          </a:ln>
+        </p:spPr>
+        <p:style>
+          <a:lnRef idx="2">
+            <a:schemeClr val="accent1">
+              <a:shade val="50000"/>
+            </a:schemeClr>
+          </a:lnRef>
+          <a:fillRef idx="1">
+            <a:schemeClr val="accent1"/>
+          </a:fillRef>
+          <a:effectRef idx="0">
+            <a:schemeClr val="accent1"/>
+          </a:effectRef>
+          <a:fontRef idx="minor">
+            <a:schemeClr val="lt1"/>
+          </a:fontRef>
+        </p:style>
+        <p:txBody>
+          <a:bodyPr wrap="none" lIns="0" rIns="0" rtlCol="0" anchor="ctr"/>
+          <a:lstStyle/>
+          <a:p>
+            <a:pPr algn="ctr"/>
+            <a:r>
+              <a:rPr lang="en-AU" sz="2000" dirty="0">
+                <a:solidFill>
+                  <a:schemeClr val="tx1"/>
+                </a:solidFill>
+              </a:rPr>
+              <a:t>Priority</a:t>
+            </a:r>
+          </a:p>
+          <a:p>
+            <a:pPr algn="ctr"/>
+            <a:r>
+              <a:rPr lang="en-AU" sz="2000" dirty="0">
+                <a:solidFill>
+                  <a:schemeClr val="tx1"/>
+                </a:solidFill>
+              </a:rPr>
+              <a:t>M</a:t>
+            </a:r>
+          </a:p>
+        </p:txBody>
+      </p:sp>
+      <p:sp>
+        <p:nvSpPr>
+          <p:cNvPr id="13" name="Rectangle 12"/>
+          <p:cNvSpPr/>
+          <p:nvPr/>
+        </p:nvSpPr>
+        <p:spPr>
+          <a:xfrm>
+            <a:off x="1182153" y="5128590"/>
+            <a:ext cx="9828000" cy="1620000"/>
+          </a:xfrm>
+          <a:prstGeom prst="rect">
+            <a:avLst/>
+          </a:prstGeom>
+          <a:solidFill>
+            <a:schemeClr val="bg1"/>
+          </a:solidFill>
+          <a:ln>
+            <a:solidFill>
+              <a:schemeClr val="accent1">
+                <a:lumMod val="50000"/>
+              </a:schemeClr>
+            </a:solidFill>
+          </a:ln>
+        </p:spPr>
+        <p:style>
+          <a:lnRef idx="2">
+            <a:schemeClr val="accent1">
+              <a:shade val="50000"/>
+            </a:schemeClr>
+          </a:lnRef>
+          <a:fillRef idx="1">
+            <a:schemeClr val="accent1"/>
+          </a:fillRef>
+          <a:effectRef idx="0">
+            <a:schemeClr val="accent1"/>
+          </a:effectRef>
+          <a:fontRef idx="minor">
+            <a:schemeClr val="lt1"/>
+          </a:fontRef>
+        </p:style>
+        <p:txBody>
+          <a:bodyPr tIns="36000" rtlCol="0" anchor="t" anchorCtr="0"/>
+          <a:lstStyle/>
+          <a:p>
+            <a:r>
+              <a:rPr lang="en-AU" sz="2000" dirty="0">
+                <a:solidFill>
+                  <a:schemeClr val="tx1"/>
+                </a:solidFill>
+              </a:rPr>
+              <a:t>Notes</a:t>
+            </a:r>
+          </a:p>
+          <a:p>
+            <a:pPr marL="179388" indent="-179388">
+              <a:buFont typeface="Arial" pitchFamily="34" charset="0"/>
+              <a:buChar char="•"/>
+            </a:pPr>
+            <a:r>
+              <a:rPr lang="en-AU" sz="2000" dirty="0">
+                <a:solidFill>
+                  <a:schemeClr val="tx1"/>
+                </a:solidFill>
+              </a:rPr>
+              <a:t> Cohorts are based on the phases, for example Cohort 1 for Phase 1 students and Cohort 2 for Phase 2</a:t>
+            </a:r>
+          </a:p>
+        </p:txBody>
+      </p:sp>
+    </p:spTree>
+    <p:extLst>
+      <p:ext uri="{BB962C8B-B14F-4D97-AF65-F5344CB8AC3E}">
+        <p14:creationId xmlns:p14="http://schemas.microsoft.com/office/powerpoint/2010/main" val="3445007689"/>
+      </p:ext>
+    </p:extLst>
+  </p:cSld>
+  <p:clrMapOvr>
+    <a:masterClrMapping/>
+  </p:clrMapOvr>
+</p:sld>
+</file>
+
+<file path=ppt/slides/slide14.xml><?xml version="1.0" encoding="utf-8"?>
+<p:sld xmlns:a="http://schemas.openxmlformats.org/drawingml/2006/main" xmlns:r="http://schemas.openxmlformats.org/officeDocument/2006/relationships" xmlns:p="http://schemas.openxmlformats.org/presentationml/2006/main">
+  <p:cSld>
+    <p:spTree>
+      <p:nvGrpSpPr>
+        <p:cNvPr id="1" name=""/>
+        <p:cNvGrpSpPr/>
+        <p:nvPr/>
+      </p:nvGrpSpPr>
+      <p:grpSpPr>
+        <a:xfrm>
+          <a:off x="0" y="0"/>
+          <a:ext cx="0" cy="0"/>
+          <a:chOff x="0" y="0"/>
+          <a:chExt cx="0" cy="0"/>
+        </a:xfrm>
+      </p:grpSpPr>
+      <p:sp>
+        <p:nvSpPr>
+          <p:cNvPr id="4" name="Rectangle 3"/>
+          <p:cNvSpPr/>
+          <p:nvPr/>
+        </p:nvSpPr>
+        <p:spPr>
+          <a:xfrm>
+            <a:off x="1182153" y="109410"/>
+            <a:ext cx="720000" cy="540000"/>
+          </a:xfrm>
+          <a:prstGeom prst="rect">
+            <a:avLst/>
+          </a:prstGeom>
+          <a:solidFill>
+            <a:schemeClr val="accent1">
+              <a:lumMod val="40000"/>
+              <a:lumOff val="60000"/>
+            </a:schemeClr>
+          </a:solidFill>
+          <a:ln>
+            <a:solidFill>
+              <a:schemeClr val="accent1">
+                <a:lumMod val="50000"/>
+              </a:schemeClr>
+            </a:solidFill>
+          </a:ln>
+        </p:spPr>
+        <p:style>
+          <a:lnRef idx="2">
+            <a:schemeClr val="accent1">
+              <a:shade val="50000"/>
+            </a:schemeClr>
+          </a:lnRef>
+          <a:fillRef idx="1">
+            <a:schemeClr val="accent1"/>
+          </a:fillRef>
+          <a:effectRef idx="0">
+            <a:schemeClr val="accent1"/>
+          </a:effectRef>
+          <a:fontRef idx="minor">
+            <a:schemeClr val="lt1"/>
+          </a:fontRef>
+        </p:style>
+        <p:txBody>
+          <a:bodyPr wrap="square" lIns="0" rIns="0" rtlCol="0" anchor="ctr"/>
+          <a:lstStyle/>
+          <a:p>
+            <a:pPr algn="ctr"/>
+            <a:r>
+              <a:rPr lang="en-AU" sz="2000" dirty="0">
+                <a:solidFill>
+                  <a:schemeClr val="tx1"/>
+                </a:solidFill>
+              </a:rPr>
+              <a:t>Story ID 0</a:t>
+            </a:r>
+          </a:p>
+        </p:txBody>
+      </p:sp>
+      <p:sp>
+        <p:nvSpPr>
+          <p:cNvPr id="6" name="Rectangle 5"/>
+          <p:cNvSpPr/>
+          <p:nvPr/>
+        </p:nvSpPr>
+        <p:spPr>
+          <a:xfrm>
+            <a:off x="1974153" y="109410"/>
+            <a:ext cx="7380000" cy="540000"/>
+          </a:xfrm>
+          <a:prstGeom prst="rect">
+            <a:avLst/>
+          </a:prstGeom>
+          <a:ln>
+            <a:solidFill>
+              <a:schemeClr val="accent1">
+                <a:lumMod val="50000"/>
+              </a:schemeClr>
+            </a:solidFill>
+          </a:ln>
+        </p:spPr>
+        <p:style>
+          <a:lnRef idx="2">
+            <a:schemeClr val="accent1">
+              <a:shade val="50000"/>
+            </a:schemeClr>
+          </a:lnRef>
+          <a:fillRef idx="1">
+            <a:schemeClr val="accent1"/>
+          </a:fillRef>
+          <a:effectRef idx="0">
+            <a:schemeClr val="accent1"/>
+          </a:effectRef>
+          <a:fontRef idx="minor">
+            <a:schemeClr val="lt1"/>
+          </a:fontRef>
+        </p:style>
+        <p:txBody>
+          <a:bodyPr rtlCol="0" anchor="ctr"/>
+          <a:lstStyle/>
+          <a:p>
+            <a:pPr algn="ctr"/>
+            <a:r>
+              <a:rPr lang="en-AU" sz="2800" dirty="0"/>
+              <a:t>Cohorts Release</a:t>
+            </a:r>
+          </a:p>
+        </p:txBody>
+      </p:sp>
+      <p:sp>
+        <p:nvSpPr>
+          <p:cNvPr id="7" name="Rectangle 6"/>
+          <p:cNvSpPr/>
+          <p:nvPr/>
+        </p:nvSpPr>
+        <p:spPr>
+          <a:xfrm>
+            <a:off x="1182153" y="822470"/>
+            <a:ext cx="9828000" cy="2340000"/>
+          </a:xfrm>
+          <a:prstGeom prst="rect">
+            <a:avLst/>
+          </a:prstGeom>
+          <a:solidFill>
+            <a:schemeClr val="tx2">
+              <a:lumMod val="20000"/>
+              <a:lumOff val="80000"/>
+            </a:schemeClr>
+          </a:solidFill>
+          <a:ln>
+            <a:solidFill>
+              <a:schemeClr val="accent1">
+                <a:lumMod val="50000"/>
+              </a:schemeClr>
+            </a:solidFill>
+          </a:ln>
+        </p:spPr>
+        <p:style>
+          <a:lnRef idx="2">
+            <a:schemeClr val="accent1">
+              <a:shade val="50000"/>
+            </a:schemeClr>
+          </a:lnRef>
+          <a:fillRef idx="1">
+            <a:schemeClr val="accent1"/>
+          </a:fillRef>
+          <a:effectRef idx="0">
+            <a:schemeClr val="accent1"/>
+          </a:effectRef>
+          <a:fontRef idx="minor">
+            <a:schemeClr val="lt1"/>
+          </a:fontRef>
+        </p:style>
+        <p:txBody>
+          <a:bodyPr rtlCol="0" anchor="t" anchorCtr="0"/>
+          <a:lstStyle/>
+          <a:p>
+            <a:r>
+              <a:rPr lang="en-US" altLang="ko-KR" sz="2400" dirty="0">
+                <a:solidFill>
+                  <a:schemeClr val="tx1"/>
+                </a:solidFill>
+              </a:rPr>
+              <a:t>As the unit coordinator, I want to be able to download all the information about Cohort 2 at the end of the semester so that the data can be removed from the system</a:t>
+            </a:r>
+            <a:endParaRPr lang="ko-KR" altLang="en-US" sz="2400" dirty="0">
+              <a:solidFill>
+                <a:schemeClr val="tx1"/>
+              </a:solidFill>
+            </a:endParaRPr>
+          </a:p>
+          <a:p>
+            <a:endParaRPr lang="en-AU" sz="2400" dirty="0">
+              <a:solidFill>
+                <a:schemeClr val="tx1"/>
+              </a:solidFill>
+            </a:endParaRPr>
+          </a:p>
+        </p:txBody>
+      </p:sp>
+      <p:sp>
+        <p:nvSpPr>
+          <p:cNvPr id="8" name="Rectangle 7"/>
+          <p:cNvSpPr/>
+          <p:nvPr/>
+        </p:nvSpPr>
+        <p:spPr>
+          <a:xfrm>
+            <a:off x="1182153" y="3335530"/>
+            <a:ext cx="9828000" cy="1620000"/>
+          </a:xfrm>
+          <a:prstGeom prst="rect">
+            <a:avLst/>
+          </a:prstGeom>
+          <a:solidFill>
+            <a:schemeClr val="accent1">
+              <a:lumMod val="20000"/>
+              <a:lumOff val="80000"/>
+            </a:schemeClr>
+          </a:solidFill>
+          <a:ln>
+            <a:solidFill>
+              <a:schemeClr val="accent1">
+                <a:lumMod val="50000"/>
+              </a:schemeClr>
+            </a:solidFill>
+          </a:ln>
+        </p:spPr>
+        <p:style>
+          <a:lnRef idx="2">
+            <a:schemeClr val="accent1">
+              <a:shade val="50000"/>
+            </a:schemeClr>
+          </a:lnRef>
+          <a:fillRef idx="1">
+            <a:schemeClr val="accent1"/>
+          </a:fillRef>
+          <a:effectRef idx="0">
+            <a:schemeClr val="accent1"/>
+          </a:effectRef>
+          <a:fontRef idx="minor">
+            <a:schemeClr val="lt1"/>
+          </a:fontRef>
+        </p:style>
+        <p:txBody>
+          <a:bodyPr tIns="36000" rtlCol="0" anchor="t" anchorCtr="0"/>
+          <a:lstStyle/>
+          <a:p>
+            <a:r>
+              <a:rPr lang="en-AU" sz="2000" dirty="0">
+                <a:solidFill>
+                  <a:schemeClr val="tx1"/>
+                </a:solidFill>
+              </a:rPr>
+              <a:t>Acceptance Criteria</a:t>
+            </a:r>
+          </a:p>
+          <a:p>
+            <a:pPr marL="342900" indent="-342900">
+              <a:buFont typeface="Arial" panose="020B0604020202020204" pitchFamily="34" charset="0"/>
+              <a:buChar char="•"/>
+            </a:pPr>
+            <a:r>
+              <a:rPr lang="en-AU" sz="2000" dirty="0">
+                <a:solidFill>
+                  <a:schemeClr val="tx1"/>
+                </a:solidFill>
+              </a:rPr>
+              <a:t>The unit coordinator should be able to generate an excel spread sheet of information about Cohort and remove from the database</a:t>
+            </a:r>
+          </a:p>
+        </p:txBody>
+      </p:sp>
+      <p:sp>
+        <p:nvSpPr>
+          <p:cNvPr id="11" name="Rectangle 10"/>
+          <p:cNvSpPr/>
+          <p:nvPr/>
+        </p:nvSpPr>
+        <p:spPr>
+          <a:xfrm>
+            <a:off x="10290153" y="109410"/>
+            <a:ext cx="720000" cy="540000"/>
+          </a:xfrm>
+          <a:prstGeom prst="rect">
+            <a:avLst/>
+          </a:prstGeom>
+          <a:solidFill>
+            <a:srgbClr val="CCF0CD">
+              <a:alpha val="20000"/>
+            </a:srgbClr>
+          </a:solidFill>
+          <a:ln>
+            <a:solidFill>
+              <a:schemeClr val="accent1">
+                <a:lumMod val="50000"/>
+              </a:schemeClr>
+            </a:solidFill>
+          </a:ln>
+        </p:spPr>
+        <p:style>
+          <a:lnRef idx="2">
+            <a:schemeClr val="accent1">
+              <a:shade val="50000"/>
+            </a:schemeClr>
+          </a:lnRef>
+          <a:fillRef idx="1">
+            <a:schemeClr val="accent1"/>
+          </a:fillRef>
+          <a:effectRef idx="0">
+            <a:schemeClr val="accent1"/>
+          </a:effectRef>
+          <a:fontRef idx="minor">
+            <a:schemeClr val="lt1"/>
+          </a:fontRef>
+        </p:style>
+        <p:txBody>
+          <a:bodyPr wrap="square" lIns="0" rIns="0" rtlCol="0" anchor="ctr"/>
+          <a:lstStyle/>
+          <a:p>
+            <a:pPr algn="ctr"/>
+            <a:r>
+              <a:rPr lang="en-AU" sz="2000" dirty="0">
+                <a:solidFill>
+                  <a:schemeClr val="tx1"/>
+                </a:solidFill>
+              </a:rPr>
+              <a:t>Story Points</a:t>
+            </a:r>
+          </a:p>
+        </p:txBody>
+      </p:sp>
+      <p:sp>
+        <p:nvSpPr>
+          <p:cNvPr id="12" name="Rectangle 11"/>
+          <p:cNvSpPr/>
+          <p:nvPr/>
+        </p:nvSpPr>
+        <p:spPr>
+          <a:xfrm>
+            <a:off x="9426153" y="109410"/>
+            <a:ext cx="792000" cy="540000"/>
+          </a:xfrm>
+          <a:prstGeom prst="rect">
+            <a:avLst/>
+          </a:prstGeom>
+          <a:solidFill>
+            <a:schemeClr val="accent4">
+              <a:lumMod val="20000"/>
+              <a:lumOff val="80000"/>
+            </a:schemeClr>
+          </a:solidFill>
+          <a:ln>
+            <a:solidFill>
+              <a:schemeClr val="accent1">
+                <a:lumMod val="50000"/>
+              </a:schemeClr>
+            </a:solidFill>
+          </a:ln>
+        </p:spPr>
+        <p:style>
+          <a:lnRef idx="2">
+            <a:schemeClr val="accent1">
+              <a:shade val="50000"/>
+            </a:schemeClr>
+          </a:lnRef>
+          <a:fillRef idx="1">
+            <a:schemeClr val="accent1"/>
+          </a:fillRef>
+          <a:effectRef idx="0">
+            <a:schemeClr val="accent1"/>
+          </a:effectRef>
+          <a:fontRef idx="minor">
+            <a:schemeClr val="lt1"/>
+          </a:fontRef>
+        </p:style>
+        <p:txBody>
+          <a:bodyPr wrap="none" lIns="0" rIns="0" rtlCol="0" anchor="ctr"/>
+          <a:lstStyle/>
+          <a:p>
+            <a:pPr algn="ctr"/>
+            <a:r>
+              <a:rPr lang="en-AU" sz="2000" dirty="0">
+                <a:solidFill>
+                  <a:schemeClr val="tx1"/>
+                </a:solidFill>
+              </a:rPr>
+              <a:t>Priority</a:t>
+            </a:r>
+          </a:p>
+          <a:p>
+            <a:pPr algn="ctr"/>
+            <a:r>
+              <a:rPr lang="en-AU" sz="2000" dirty="0">
+                <a:solidFill>
+                  <a:schemeClr val="tx1"/>
+                </a:solidFill>
+              </a:rPr>
+              <a:t>M</a:t>
+            </a:r>
+          </a:p>
+        </p:txBody>
+      </p:sp>
+      <p:sp>
+        <p:nvSpPr>
+          <p:cNvPr id="13" name="Rectangle 12"/>
+          <p:cNvSpPr/>
+          <p:nvPr/>
+        </p:nvSpPr>
+        <p:spPr>
+          <a:xfrm>
+            <a:off x="1182153" y="5128590"/>
+            <a:ext cx="9828000" cy="1620000"/>
+          </a:xfrm>
+          <a:prstGeom prst="rect">
+            <a:avLst/>
+          </a:prstGeom>
+          <a:solidFill>
+            <a:schemeClr val="bg1"/>
+          </a:solidFill>
+          <a:ln>
+            <a:solidFill>
+              <a:schemeClr val="accent1">
+                <a:lumMod val="50000"/>
+              </a:schemeClr>
+            </a:solidFill>
+          </a:ln>
+        </p:spPr>
+        <p:style>
+          <a:lnRef idx="2">
+            <a:schemeClr val="accent1">
+              <a:shade val="50000"/>
+            </a:schemeClr>
+          </a:lnRef>
+          <a:fillRef idx="1">
+            <a:schemeClr val="accent1"/>
+          </a:fillRef>
+          <a:effectRef idx="0">
+            <a:schemeClr val="accent1"/>
+          </a:effectRef>
+          <a:fontRef idx="minor">
+            <a:schemeClr val="lt1"/>
+          </a:fontRef>
+        </p:style>
+        <p:txBody>
+          <a:bodyPr tIns="36000" rtlCol="0" anchor="t" anchorCtr="0"/>
+          <a:lstStyle/>
+          <a:p>
+            <a:r>
+              <a:rPr lang="en-AU" sz="2000" dirty="0">
+                <a:solidFill>
+                  <a:schemeClr val="tx1"/>
+                </a:solidFill>
+              </a:rPr>
+              <a:t>Notes</a:t>
+            </a:r>
+          </a:p>
+          <a:p>
+            <a:pPr marL="179388" indent="-179388">
+              <a:buFont typeface="Arial" pitchFamily="34" charset="0"/>
+              <a:buChar char="•"/>
+            </a:pPr>
+            <a:r>
+              <a:rPr lang="en-AU" sz="2000" dirty="0">
+                <a:solidFill>
+                  <a:schemeClr val="tx1"/>
+                </a:solidFill>
+              </a:rPr>
+              <a:t> Teams/Students who are in phase 2 will be removed from the system and the data stored can</a:t>
+            </a:r>
+            <a:r>
+              <a:rPr lang="en-AU" sz="2000">
+                <a:solidFill>
+                  <a:schemeClr val="tx1"/>
+                </a:solidFill>
+              </a:rPr>
+              <a:t>/will </a:t>
+            </a:r>
+            <a:r>
+              <a:rPr lang="en-AU" sz="2000" dirty="0">
+                <a:solidFill>
+                  <a:schemeClr val="tx1"/>
+                </a:solidFill>
+              </a:rPr>
+              <a:t>be extracted from </a:t>
+            </a:r>
+            <a:r>
+              <a:rPr lang="en-AU" sz="2000">
+                <a:solidFill>
+                  <a:schemeClr val="tx1"/>
+                </a:solidFill>
+              </a:rPr>
+              <a:t>the system</a:t>
+            </a:r>
+            <a:endParaRPr lang="en-AU" sz="2000" dirty="0">
+              <a:solidFill>
+                <a:schemeClr val="tx1"/>
+              </a:solidFill>
+            </a:endParaRPr>
+          </a:p>
+        </p:txBody>
+      </p:sp>
+    </p:spTree>
+    <p:extLst>
+      <p:ext uri="{BB962C8B-B14F-4D97-AF65-F5344CB8AC3E}">
+        <p14:creationId xmlns:p14="http://schemas.microsoft.com/office/powerpoint/2010/main" val="831793290"/>
       </p:ext>
     </p:extLst>
   </p:cSld>
@@ -5734,7 +6789,7 @@
                   <a:schemeClr val="tx1"/>
                 </a:solidFill>
               </a:rPr>
-              <a:t>As the tutor, I want to be able to add a student in case of late enrollment</a:t>
+              <a:t>As the unit coordinator, I want to be able to add a student in case of late enrollment so that the student can be allocated to a team later</a:t>
             </a:r>
             <a:endParaRPr lang="en-AU" altLang="ko-KR" sz="2400" dirty="0">
               <a:solidFill>
@@ -6333,15 +7388,8 @@
                   <a:schemeClr val="tx1"/>
                 </a:solidFill>
               </a:rPr>
-              <a:t>be able to sign up industry partners</a:t>
-            </a:r>
-            <a:endParaRPr lang="ko-KR" altLang="en-US" sz="2400" dirty="0">
-              <a:solidFill>
-                <a:schemeClr val="tx1"/>
-              </a:solidFill>
-            </a:endParaRPr>
-          </a:p>
-          <a:p>
+              <a:t>be able to sign up industry partners so that they can use the system</a:t>
+            </a:r>
             <a:endParaRPr lang="en-AU" sz="2400" dirty="0">
               <a:solidFill>
                 <a:schemeClr val="tx1"/>
@@ -6824,7 +7872,7 @@
                   <a:schemeClr val="tx1"/>
                 </a:solidFill>
               </a:rPr>
-              <a:t>As the unit coordinator, I want to be able to remove a student in case of unit withdrawal  </a:t>
+              <a:t>As the unit coordinator, I want to be able to remove a student so that in case of unit withdrawal, students can be removed from the system</a:t>
             </a:r>
             <a:endParaRPr lang="en-AU" altLang="ko-KR" sz="2400" dirty="0">
               <a:solidFill>
@@ -7308,7 +8356,7 @@
                   <a:schemeClr val="tx1"/>
                 </a:solidFill>
               </a:rPr>
-              <a:t>As the unit coordinator, I want to be able to generate teams for those who haven’t signed up for a team yet</a:t>
+              <a:t>As the unit coordinator, I want to be able to generate teams for those who haven’t signed up for a team yet so that no one gets left behind without a team</a:t>
             </a:r>
             <a:endParaRPr lang="ko-KR" altLang="en-US" sz="2400" dirty="0">
               <a:solidFill>
@@ -7803,7 +8851,7 @@
                   <a:schemeClr val="tx1"/>
                 </a:solidFill>
               </a:rPr>
-              <a:t>As the unit coordinator, I want to be able to edit teams</a:t>
+              <a:t>As the unit coordinator, I want to be able to edit teams so that a student can be added and/or removed from the team</a:t>
             </a:r>
             <a:endParaRPr lang="ko-KR" altLang="en-US" sz="2400" dirty="0">
               <a:solidFill>
@@ -8287,7 +9335,7 @@
                   <a:schemeClr val="tx1"/>
                 </a:solidFill>
               </a:rPr>
-              <a:t>As the unit coordinator, I want to be able to upload projects</a:t>
+              <a:t>As the unit coordinator, I want to be able to upload projects so that students can read through the project outline and apply for them later</a:t>
             </a:r>
             <a:endParaRPr lang="ko-KR" altLang="en-US" sz="2400" dirty="0">
               <a:solidFill>
@@ -8771,7 +9819,7 @@
                   <a:schemeClr val="tx1"/>
                 </a:solidFill>
               </a:rPr>
-              <a:t>As the unit coordinator, I want to be able to see cover letters and CVs that students uploaded</a:t>
+              <a:t>As the unit coordinator, I want to be able to see cover letters and CVs that students uploaded so that they can be marked and be used to rank teams later</a:t>
             </a:r>
             <a:endParaRPr lang="ko-KR" altLang="en-US" sz="2400" dirty="0">
               <a:solidFill>
@@ -9255,7 +10303,7 @@
                   <a:schemeClr val="tx1"/>
                 </a:solidFill>
               </a:rPr>
-              <a:t>As the unit coordinator, I want to be able to rank teams for projects</a:t>
+              <a:t>As the unit coordinator, I want to be able to rank teams for projects so that students will be allocated with projects</a:t>
             </a:r>
             <a:endParaRPr lang="ko-KR" altLang="en-US" sz="2400" dirty="0">
               <a:solidFill>

</xml_diff>

<commit_message>
User stories - Unit coordinator Final
</commit_message>
<xml_diff>
--- a/User_story/Yoon User Stories.pptx
+++ b/User_story/Yoon User Stories.pptx
@@ -5,20 +5,22 @@
     <p:sldMasterId id="2147483648" r:id="rId1"/>
   </p:sldMasterIdLst>
   <p:sldIdLst>
-    <p:sldId id="268" r:id="rId2"/>
-    <p:sldId id="269" r:id="rId3"/>
-    <p:sldId id="270" r:id="rId4"/>
-    <p:sldId id="271" r:id="rId5"/>
-    <p:sldId id="272" r:id="rId6"/>
-    <p:sldId id="273" r:id="rId7"/>
-    <p:sldId id="274" r:id="rId8"/>
-    <p:sldId id="279" r:id="rId9"/>
-    <p:sldId id="275" r:id="rId10"/>
-    <p:sldId id="276" r:id="rId11"/>
-    <p:sldId id="277" r:id="rId12"/>
-    <p:sldId id="278" r:id="rId13"/>
-    <p:sldId id="280" r:id="rId14"/>
-    <p:sldId id="281" r:id="rId15"/>
+    <p:sldId id="284" r:id="rId2"/>
+    <p:sldId id="283" r:id="rId3"/>
+    <p:sldId id="268" r:id="rId4"/>
+    <p:sldId id="269" r:id="rId5"/>
+    <p:sldId id="270" r:id="rId6"/>
+    <p:sldId id="271" r:id="rId7"/>
+    <p:sldId id="272" r:id="rId8"/>
+    <p:sldId id="273" r:id="rId9"/>
+    <p:sldId id="274" r:id="rId10"/>
+    <p:sldId id="279" r:id="rId11"/>
+    <p:sldId id="275" r:id="rId12"/>
+    <p:sldId id="276" r:id="rId13"/>
+    <p:sldId id="277" r:id="rId14"/>
+    <p:sldId id="278" r:id="rId15"/>
+    <p:sldId id="280" r:id="rId16"/>
+    <p:sldId id="281" r:id="rId17"/>
   </p:sldIdLst>
   <p:sldSz cx="12192000" cy="6858000"/>
   <p:notesSz cx="6858000" cy="9144000"/>
@@ -130,7 +132,7 @@
   <pc:docChgLst>
     <pc:chgData name="김윤겸" userId="e4af893241f1c67e" providerId="LiveId" clId="{0D806EF5-75AB-4BD7-B434-3714CC0F41D9}"/>
     <pc:docChg chg="undo custSel addSld delSld modSld sldOrd">
-      <pc:chgData name="김윤겸" userId="e4af893241f1c67e" providerId="LiveId" clId="{0D806EF5-75AB-4BD7-B434-3714CC0F41D9}" dt="2017-09-18T06:39:34.219" v="5718" actId="20577"/>
+      <pc:chgData name="김윤겸" userId="e4af893241f1c67e" providerId="LiveId" clId="{0D806EF5-75AB-4BD7-B434-3714CC0F41D9}" dt="2017-09-18T06:47:10.126" v="6338" actId="20577"/>
       <pc:docMkLst>
         <pc:docMk/>
       </pc:docMkLst>
@@ -291,7 +293,7 @@
         </pc:spChg>
       </pc:sldChg>
       <pc:sldChg chg="modSp add">
-        <pc:chgData name="김윤겸" userId="e4af893241f1c67e" providerId="LiveId" clId="{0D806EF5-75AB-4BD7-B434-3714CC0F41D9}" dt="2017-09-18T06:25:07.048" v="4032" actId="20577"/>
+        <pc:chgData name="김윤겸" userId="e4af893241f1c67e" providerId="LiveId" clId="{0D806EF5-75AB-4BD7-B434-3714CC0F41D9}" dt="2017-09-18T06:44:04.394" v="5860" actId="20577"/>
         <pc:sldMkLst>
           <pc:docMk/>
           <pc:sldMk cId="3261240586" sldId="268"/>
@@ -321,7 +323,7 @@
           </ac:spMkLst>
         </pc:spChg>
         <pc:spChg chg="mod">
-          <ac:chgData name="김윤겸" userId="e4af893241f1c67e" providerId="LiveId" clId="{0D806EF5-75AB-4BD7-B434-3714CC0F41D9}" dt="2017-09-07T11:08:14.426" v="1551" actId="20577"/>
+          <ac:chgData name="김윤겸" userId="e4af893241f1c67e" providerId="LiveId" clId="{0D806EF5-75AB-4BD7-B434-3714CC0F41D9}" dt="2017-09-18T06:44:04.394" v="5860" actId="20577"/>
           <ac:spMkLst>
             <pc:docMk/>
             <pc:sldMk cId="3261240586" sldId="268"/>
@@ -751,14 +753,14 @@
         </pc:spChg>
       </pc:sldChg>
       <pc:sldChg chg="add del">
-        <pc:chgData name="김윤겸" userId="e4af893241f1c67e" providerId="LiveId" clId="{0D806EF5-75AB-4BD7-B434-3714CC0F41D9}" dt="2017-09-18T06:31:15.780" v="4676"/>
+        <pc:chgData name="김윤겸" userId="e4af893241f1c67e" providerId="LiveId" clId="{0D806EF5-75AB-4BD7-B434-3714CC0F41D9}" dt="2017-09-18T06:31:15.780" v="4676" actId="20577"/>
         <pc:sldMkLst>
           <pc:docMk/>
           <pc:sldMk cId="2199744337" sldId="280"/>
         </pc:sldMkLst>
       </pc:sldChg>
       <pc:sldChg chg="modSp add">
-        <pc:chgData name="김윤겸" userId="e4af893241f1c67e" providerId="LiveId" clId="{0D806EF5-75AB-4BD7-B434-3714CC0F41D9}" dt="2017-09-18T06:37:21.711" v="5287" actId="20577"/>
+        <pc:chgData name="김윤겸" userId="e4af893241f1c67e" providerId="LiveId" clId="{0D806EF5-75AB-4BD7-B434-3714CC0F41D9}" dt="2017-09-18T06:44:35.152" v="5926" actId="20577"/>
         <pc:sldMkLst>
           <pc:docMk/>
           <pc:sldMk cId="3445007689" sldId="280"/>
@@ -772,7 +774,7 @@
           </ac:spMkLst>
         </pc:spChg>
         <pc:spChg chg="mod">
-          <ac:chgData name="김윤겸" userId="e4af893241f1c67e" providerId="LiveId" clId="{0D806EF5-75AB-4BD7-B434-3714CC0F41D9}" dt="2017-09-18T06:36:22.235" v="5131" actId="20577"/>
+          <ac:chgData name="김윤겸" userId="e4af893241f1c67e" providerId="LiveId" clId="{0D806EF5-75AB-4BD7-B434-3714CC0F41D9}" dt="2017-09-18T06:44:35.152" v="5926" actId="20577"/>
           <ac:spMkLst>
             <pc:docMk/>
             <pc:sldMk cId="3445007689" sldId="280"/>
@@ -831,6 +833,113 @@
           <ac:spMkLst>
             <pc:docMk/>
             <pc:sldMk cId="831793290" sldId="281"/>
+            <ac:spMk id="13" creationId="{00000000-0000-0000-0000-000000000000}"/>
+          </ac:spMkLst>
+        </pc:spChg>
+      </pc:sldChg>
+      <pc:sldChg chg="add del">
+        <pc:chgData name="김윤겸" userId="e4af893241f1c67e" providerId="LiveId" clId="{0D806EF5-75AB-4BD7-B434-3714CC0F41D9}" dt="2017-09-18T06:44:47.013" v="5929" actId="2696"/>
+        <pc:sldMkLst>
+          <pc:docMk/>
+          <pc:sldMk cId="2888596689" sldId="282"/>
+        </pc:sldMkLst>
+      </pc:sldChg>
+      <pc:sldChg chg="modSp add del">
+        <pc:chgData name="김윤겸" userId="e4af893241f1c67e" providerId="LiveId" clId="{0D806EF5-75AB-4BD7-B434-3714CC0F41D9}" dt="2017-09-18T06:43:31.752" v="5793" actId="2696"/>
+        <pc:sldMkLst>
+          <pc:docMk/>
+          <pc:sldMk cId="3108456170" sldId="282"/>
+        </pc:sldMkLst>
+        <pc:spChg chg="mod">
+          <ac:chgData name="김윤겸" userId="e4af893241f1c67e" providerId="LiveId" clId="{0D806EF5-75AB-4BD7-B434-3714CC0F41D9}" dt="2017-09-18T06:43:23.058" v="5792" actId="20577"/>
+          <ac:spMkLst>
+            <pc:docMk/>
+            <pc:sldMk cId="3108456170" sldId="282"/>
+            <ac:spMk id="7" creationId="{00000000-0000-0000-0000-000000000000}"/>
+          </ac:spMkLst>
+        </pc:spChg>
+      </pc:sldChg>
+      <pc:sldChg chg="add del">
+        <pc:chgData name="김윤겸" userId="e4af893241f1c67e" providerId="LiveId" clId="{0D806EF5-75AB-4BD7-B434-3714CC0F41D9}" dt="2017-09-18T06:43:01.033" v="5720" actId="2696"/>
+        <pc:sldMkLst>
+          <pc:docMk/>
+          <pc:sldMk cId="4162809487" sldId="282"/>
+        </pc:sldMkLst>
+      </pc:sldChg>
+      <pc:sldChg chg="modSp add">
+        <pc:chgData name="김윤겸" userId="e4af893241f1c67e" providerId="LiveId" clId="{0D806EF5-75AB-4BD7-B434-3714CC0F41D9}" dt="2017-09-18T06:47:10.126" v="6338" actId="20577"/>
+        <pc:sldMkLst>
+          <pc:docMk/>
+          <pc:sldMk cId="1212842850" sldId="283"/>
+        </pc:sldMkLst>
+        <pc:spChg chg="mod">
+          <ac:chgData name="김윤겸" userId="e4af893241f1c67e" providerId="LiveId" clId="{0D806EF5-75AB-4BD7-B434-3714CC0F41D9}" dt="2017-09-18T06:45:49.515" v="6083" actId="20577"/>
+          <ac:spMkLst>
+            <pc:docMk/>
+            <pc:sldMk cId="1212842850" sldId="283"/>
+            <ac:spMk id="6" creationId="{00000000-0000-0000-0000-000000000000}"/>
+          </ac:spMkLst>
+        </pc:spChg>
+        <pc:spChg chg="mod">
+          <ac:chgData name="김윤겸" userId="e4af893241f1c67e" providerId="LiveId" clId="{0D806EF5-75AB-4BD7-B434-3714CC0F41D9}" dt="2017-09-18T06:47:10.126" v="6338" actId="20577"/>
+          <ac:spMkLst>
+            <pc:docMk/>
+            <pc:sldMk cId="1212842850" sldId="283"/>
+            <ac:spMk id="7" creationId="{00000000-0000-0000-0000-000000000000}"/>
+          </ac:spMkLst>
+        </pc:spChg>
+        <pc:spChg chg="mod">
+          <ac:chgData name="김윤겸" userId="e4af893241f1c67e" providerId="LiveId" clId="{0D806EF5-75AB-4BD7-B434-3714CC0F41D9}" dt="2017-09-18T06:46:58.621" v="6302" actId="20577"/>
+          <ac:spMkLst>
+            <pc:docMk/>
+            <pc:sldMk cId="1212842850" sldId="283"/>
+            <ac:spMk id="8" creationId="{00000000-0000-0000-0000-000000000000}"/>
+          </ac:spMkLst>
+        </pc:spChg>
+        <pc:spChg chg="mod">
+          <ac:chgData name="김윤겸" userId="e4af893241f1c67e" providerId="LiveId" clId="{0D806EF5-75AB-4BD7-B434-3714CC0F41D9}" dt="2017-09-18T06:47:01.516" v="6303" actId="20577"/>
+          <ac:spMkLst>
+            <pc:docMk/>
+            <pc:sldMk cId="1212842850" sldId="283"/>
+            <ac:spMk id="13" creationId="{00000000-0000-0000-0000-000000000000}"/>
+          </ac:spMkLst>
+        </pc:spChg>
+      </pc:sldChg>
+      <pc:sldChg chg="modSp add">
+        <pc:chgData name="김윤겸" userId="e4af893241f1c67e" providerId="LiveId" clId="{0D806EF5-75AB-4BD7-B434-3714CC0F41D9}" dt="2017-09-18T06:45:39.029" v="6076" actId="6549"/>
+        <pc:sldMkLst>
+          <pc:docMk/>
+          <pc:sldMk cId="731467881" sldId="284"/>
+        </pc:sldMkLst>
+        <pc:spChg chg="mod">
+          <ac:chgData name="김윤겸" userId="e4af893241f1c67e" providerId="LiveId" clId="{0D806EF5-75AB-4BD7-B434-3714CC0F41D9}" dt="2017-09-18T06:44:58.499" v="5953" actId="20577"/>
+          <ac:spMkLst>
+            <pc:docMk/>
+            <pc:sldMk cId="731467881" sldId="284"/>
+            <ac:spMk id="6" creationId="{00000000-0000-0000-0000-000000000000}"/>
+          </ac:spMkLst>
+        </pc:spChg>
+        <pc:spChg chg="mod">
+          <ac:chgData name="김윤겸" userId="e4af893241f1c67e" providerId="LiveId" clId="{0D806EF5-75AB-4BD7-B434-3714CC0F41D9}" dt="2017-09-18T06:45:21.742" v="6034" actId="20577"/>
+          <ac:spMkLst>
+            <pc:docMk/>
+            <pc:sldMk cId="731467881" sldId="284"/>
+            <ac:spMk id="7" creationId="{00000000-0000-0000-0000-000000000000}"/>
+          </ac:spMkLst>
+        </pc:spChg>
+        <pc:spChg chg="mod">
+          <ac:chgData name="김윤겸" userId="e4af893241f1c67e" providerId="LiveId" clId="{0D806EF5-75AB-4BD7-B434-3714CC0F41D9}" dt="2017-09-18T06:45:35.320" v="6075" actId="20577"/>
+          <ac:spMkLst>
+            <pc:docMk/>
+            <pc:sldMk cId="731467881" sldId="284"/>
+            <ac:spMk id="8" creationId="{00000000-0000-0000-0000-000000000000}"/>
+          </ac:spMkLst>
+        </pc:spChg>
+        <pc:spChg chg="mod">
+          <ac:chgData name="김윤겸" userId="e4af893241f1c67e" providerId="LiveId" clId="{0D806EF5-75AB-4BD7-B434-3714CC0F41D9}" dt="2017-09-18T06:45:39.029" v="6076" actId="6549"/>
+          <ac:spMkLst>
+            <pc:docMk/>
+            <pc:sldMk cId="731467881" sldId="284"/>
             <ac:spMk id="13" creationId="{00000000-0000-0000-0000-000000000000}"/>
           </ac:spMkLst>
         </pc:spChg>
@@ -3802,7 +3911,7 @@
             <a:pPr algn="ctr"/>
             <a:r>
               <a:rPr lang="en-AU" sz="2800" dirty="0"/>
-              <a:t>Student Details</a:t>
+              <a:t>Sign up/Log in</a:t>
             </a:r>
           </a:p>
         </p:txBody>
@@ -3861,7 +3970,7 @@
                   <a:schemeClr val="tx1"/>
                 </a:solidFill>
               </a:rPr>
-              <a:t>As the unit coordinator, I want to be able to see student details so that I can see if there is an issue with student details</a:t>
+              <a:t>As the unit coordinator, I want to be able to create an account and be able to sign in so that I can use the system</a:t>
             </a:r>
           </a:p>
         </p:txBody>
@@ -3934,7 +4043,7 @@
                   <a:schemeClr val="tx1"/>
                 </a:solidFill>
               </a:rPr>
-              <a:t>Create Student Details Page</a:t>
+              <a:t>Sign up/Log in page</a:t>
             </a:r>
           </a:p>
         </p:txBody>
@@ -4134,7 +4243,7 @@
                   <a:schemeClr val="tx1"/>
                 </a:solidFill>
               </a:rPr>
-              <a:t> The coordinator should be able to see student details including current GPA and Major</a:t>
+              <a:t> </a:t>
             </a:r>
           </a:p>
         </p:txBody>
@@ -4142,7 +4251,7 @@
     </p:spTree>
     <p:extLst>
       <p:ext uri="{BB962C8B-B14F-4D97-AF65-F5344CB8AC3E}">
-        <p14:creationId xmlns:p14="http://schemas.microsoft.com/office/powerpoint/2010/main" val="3261240586"/>
+        <p14:creationId xmlns:p14="http://schemas.microsoft.com/office/powerpoint/2010/main" val="731467881"/>
       </p:ext>
     </p:extLst>
   </p:cSld>
@@ -4274,7 +4383,7 @@
             <a:pPr algn="ctr"/>
             <a:r>
               <a:rPr lang="en-AU" sz="2800" dirty="0"/>
-              <a:t>Assign Projects</a:t>
+              <a:t>View CV/Cover Letters</a:t>
             </a:r>
           </a:p>
         </p:txBody>
@@ -4333,7 +4442,7 @@
                   <a:schemeClr val="tx1"/>
                 </a:solidFill>
               </a:rPr>
-              <a:t>As the unit coordinator, I want to be able to assign projects for teams so that the teams who did not get a project assigned can work on backup projects</a:t>
+              <a:t>As the unit coordinator, I want to be able to see cover letters and CVs that students uploaded so that they can be marked and be used to rank teams later</a:t>
             </a:r>
             <a:endParaRPr lang="ko-KR" altLang="en-US" sz="2400" dirty="0">
               <a:solidFill>
@@ -4418,7 +4527,7 @@
                   <a:schemeClr val="tx1"/>
                 </a:solidFill>
               </a:rPr>
-              <a:t>The unit coordinator should be able to assign projects for teams</a:t>
+              <a:t>The unit coordinator should be able to see cover letters and CV</a:t>
             </a:r>
           </a:p>
         </p:txBody>
@@ -4618,7 +4727,7 @@
                   <a:schemeClr val="tx1"/>
                 </a:solidFill>
               </a:rPr>
-              <a:t> Project could be automatically assigned as project supervisors and students finalise their preferences, and in that case, groups that weren’t able to secure a project should also get assigned with backup projects</a:t>
+              <a:t> For marking purposes too</a:t>
             </a:r>
           </a:p>
         </p:txBody>
@@ -4626,7 +4735,7 @@
     </p:spTree>
     <p:extLst>
       <p:ext uri="{BB962C8B-B14F-4D97-AF65-F5344CB8AC3E}">
-        <p14:creationId xmlns:p14="http://schemas.microsoft.com/office/powerpoint/2010/main" val="342639669"/>
+        <p14:creationId xmlns:p14="http://schemas.microsoft.com/office/powerpoint/2010/main" val="35284914"/>
       </p:ext>
     </p:extLst>
   </p:cSld>
@@ -4758,7 +4867,7 @@
             <a:pPr algn="ctr"/>
             <a:r>
               <a:rPr lang="en-AU" sz="2800" dirty="0"/>
-              <a:t>Fortnightly Reports</a:t>
+              <a:t>Rank Teams for Projects</a:t>
             </a:r>
           </a:p>
         </p:txBody>
@@ -4817,8 +4926,15 @@
                   <a:schemeClr val="tx1"/>
                 </a:solidFill>
               </a:rPr>
-              <a:t>As the unit coordinator, I want to be able to see fortnightly reflection reports so that I know which teams are on track and which team are not</a:t>
-            </a:r>
+              <a:t>As the unit coordinator, I want to be able to rank teams for projects so that students will be allocated with projects</a:t>
+            </a:r>
+            <a:endParaRPr lang="ko-KR" altLang="en-US" sz="2400" dirty="0">
+              <a:solidFill>
+                <a:schemeClr val="tx1"/>
+              </a:solidFill>
+            </a:endParaRPr>
+          </a:p>
+          <a:p>
             <a:endParaRPr lang="en-AU" sz="2400" dirty="0">
               <a:solidFill>
                 <a:schemeClr val="tx1"/>
@@ -4895,7 +5011,7 @@
                   <a:schemeClr val="tx1"/>
                 </a:solidFill>
               </a:rPr>
-              <a:t>The unit coordinator should be able to see fortnightly reports that students have submitted</a:t>
+              <a:t>The unit coordinator should be able to rank teams for projects on behalf of project supervisors</a:t>
             </a:r>
           </a:p>
         </p:txBody>
@@ -5095,7 +5211,7 @@
                   <a:schemeClr val="tx1"/>
                 </a:solidFill>
               </a:rPr>
-              <a:t> The tutors should be able to see this as well</a:t>
+              <a:t> Needs to be discussed</a:t>
             </a:r>
           </a:p>
         </p:txBody>
@@ -5103,7 +5219,7 @@
     </p:spTree>
     <p:extLst>
       <p:ext uri="{BB962C8B-B14F-4D97-AF65-F5344CB8AC3E}">
-        <p14:creationId xmlns:p14="http://schemas.microsoft.com/office/powerpoint/2010/main" val="344383312"/>
+        <p14:creationId xmlns:p14="http://schemas.microsoft.com/office/powerpoint/2010/main" val="2080687648"/>
       </p:ext>
     </p:extLst>
   </p:cSld>
@@ -5235,7 +5351,7 @@
             <a:pPr algn="ctr"/>
             <a:r>
               <a:rPr lang="en-AU" sz="2800" dirty="0"/>
-              <a:t>Mark Assessments</a:t>
+              <a:t>Assign Projects</a:t>
             </a:r>
           </a:p>
         </p:txBody>
@@ -5294,7 +5410,7 @@
                   <a:schemeClr val="tx1"/>
                 </a:solidFill>
               </a:rPr>
-              <a:t>As the unit coordinator, I want to be able to mark groups/individuals for different assessment so that the marks can be released later</a:t>
+              <a:t>As the unit coordinator, I want to be able to assign projects for teams so that the teams who did not get a project assigned can work on backup projects</a:t>
             </a:r>
             <a:endParaRPr lang="ko-KR" altLang="en-US" sz="2400" dirty="0">
               <a:solidFill>
@@ -5379,7 +5495,7 @@
                   <a:schemeClr val="tx1"/>
                 </a:solidFill>
               </a:rPr>
-              <a:t>The unit coordinator should be able to mark assessments </a:t>
+              <a:t>The unit coordinator should be able to assign projects for teams</a:t>
             </a:r>
           </a:p>
         </p:txBody>
@@ -5579,21 +5695,7 @@
                   <a:schemeClr val="tx1"/>
                 </a:solidFill>
               </a:rPr>
-              <a:t> Marks will be released later at the coordinators discretion</a:t>
-            </a:r>
-          </a:p>
-          <a:p>
-            <a:pPr marL="179388" indent="-179388">
-              <a:buFont typeface="Arial" pitchFamily="34" charset="0"/>
-              <a:buChar char="•"/>
-            </a:pPr>
-            <a:r>
-              <a:rPr lang="en-AU" sz="2000" dirty="0">
-                <a:solidFill>
-                  <a:schemeClr val="tx1"/>
-                </a:solidFill>
-              </a:rPr>
-              <a:t>Tutors should be able to do the same, but only the coordinator gets to decide whether and when to release the marks</a:t>
+              <a:t> Project could be automatically assigned as project supervisors and students finalise their preferences, and in that case, groups that weren’t able to secure a project should also get assigned with backup projects</a:t>
             </a:r>
           </a:p>
         </p:txBody>
@@ -5601,7 +5703,7 @@
     </p:spTree>
     <p:extLst>
       <p:ext uri="{BB962C8B-B14F-4D97-AF65-F5344CB8AC3E}">
-        <p14:creationId xmlns:p14="http://schemas.microsoft.com/office/powerpoint/2010/main" val="3161105411"/>
+        <p14:creationId xmlns:p14="http://schemas.microsoft.com/office/powerpoint/2010/main" val="342639669"/>
       </p:ext>
     </p:extLst>
   </p:cSld>
@@ -5733,7 +5835,7 @@
             <a:pPr algn="ctr"/>
             <a:r>
               <a:rPr lang="en-AU" sz="2800" dirty="0"/>
-              <a:t>Cohorts View/Edit</a:t>
+              <a:t>Fortnightly Reports</a:t>
             </a:r>
           </a:p>
         </p:txBody>
@@ -5792,7 +5894,982 @@
                   <a:schemeClr val="tx1"/>
                 </a:solidFill>
               </a:rPr>
-              <a:t>As the unit coordinator, I want to be able to view/edit cohorts so that I can see which teams and students are in which cohort </a:t>
+              <a:t>As the unit coordinator, I want to be able to see fortnightly reflection reports so that I know which teams are on track and which team are not</a:t>
+            </a:r>
+            <a:endParaRPr lang="en-AU" sz="2400" dirty="0">
+              <a:solidFill>
+                <a:schemeClr val="tx1"/>
+              </a:solidFill>
+            </a:endParaRPr>
+          </a:p>
+        </p:txBody>
+      </p:sp>
+      <p:sp>
+        <p:nvSpPr>
+          <p:cNvPr id="8" name="Rectangle 7"/>
+          <p:cNvSpPr/>
+          <p:nvPr/>
+        </p:nvSpPr>
+        <p:spPr>
+          <a:xfrm>
+            <a:off x="1182153" y="3335530"/>
+            <a:ext cx="9828000" cy="1620000"/>
+          </a:xfrm>
+          <a:prstGeom prst="rect">
+            <a:avLst/>
+          </a:prstGeom>
+          <a:solidFill>
+            <a:schemeClr val="accent1">
+              <a:lumMod val="20000"/>
+              <a:lumOff val="80000"/>
+            </a:schemeClr>
+          </a:solidFill>
+          <a:ln>
+            <a:solidFill>
+              <a:schemeClr val="accent1">
+                <a:lumMod val="50000"/>
+              </a:schemeClr>
+            </a:solidFill>
+          </a:ln>
+        </p:spPr>
+        <p:style>
+          <a:lnRef idx="2">
+            <a:schemeClr val="accent1">
+              <a:shade val="50000"/>
+            </a:schemeClr>
+          </a:lnRef>
+          <a:fillRef idx="1">
+            <a:schemeClr val="accent1"/>
+          </a:fillRef>
+          <a:effectRef idx="0">
+            <a:schemeClr val="accent1"/>
+          </a:effectRef>
+          <a:fontRef idx="minor">
+            <a:schemeClr val="lt1"/>
+          </a:fontRef>
+        </p:style>
+        <p:txBody>
+          <a:bodyPr tIns="36000" rtlCol="0" anchor="t" anchorCtr="0"/>
+          <a:lstStyle/>
+          <a:p>
+            <a:r>
+              <a:rPr lang="en-AU" sz="2000" dirty="0">
+                <a:solidFill>
+                  <a:schemeClr val="tx1"/>
+                </a:solidFill>
+              </a:rPr>
+              <a:t>Acceptance Criteria</a:t>
+            </a:r>
+          </a:p>
+          <a:p>
+            <a:pPr marL="342900" indent="-342900">
+              <a:buFont typeface="Arial" panose="020B0604020202020204" pitchFamily="34" charset="0"/>
+              <a:buChar char="•"/>
+            </a:pPr>
+            <a:r>
+              <a:rPr lang="en-AU" sz="2000" dirty="0">
+                <a:solidFill>
+                  <a:schemeClr val="tx1"/>
+                </a:solidFill>
+              </a:rPr>
+              <a:t>The unit coordinator should be able to see fortnightly reports that students have submitted</a:t>
+            </a:r>
+          </a:p>
+        </p:txBody>
+      </p:sp>
+      <p:sp>
+        <p:nvSpPr>
+          <p:cNvPr id="11" name="Rectangle 10"/>
+          <p:cNvSpPr/>
+          <p:nvPr/>
+        </p:nvSpPr>
+        <p:spPr>
+          <a:xfrm>
+            <a:off x="10290153" y="109410"/>
+            <a:ext cx="720000" cy="540000"/>
+          </a:xfrm>
+          <a:prstGeom prst="rect">
+            <a:avLst/>
+          </a:prstGeom>
+          <a:solidFill>
+            <a:srgbClr val="CCF0CD">
+              <a:alpha val="20000"/>
+            </a:srgbClr>
+          </a:solidFill>
+          <a:ln>
+            <a:solidFill>
+              <a:schemeClr val="accent1">
+                <a:lumMod val="50000"/>
+              </a:schemeClr>
+            </a:solidFill>
+          </a:ln>
+        </p:spPr>
+        <p:style>
+          <a:lnRef idx="2">
+            <a:schemeClr val="accent1">
+              <a:shade val="50000"/>
+            </a:schemeClr>
+          </a:lnRef>
+          <a:fillRef idx="1">
+            <a:schemeClr val="accent1"/>
+          </a:fillRef>
+          <a:effectRef idx="0">
+            <a:schemeClr val="accent1"/>
+          </a:effectRef>
+          <a:fontRef idx="minor">
+            <a:schemeClr val="lt1"/>
+          </a:fontRef>
+        </p:style>
+        <p:txBody>
+          <a:bodyPr wrap="square" lIns="0" rIns="0" rtlCol="0" anchor="ctr"/>
+          <a:lstStyle/>
+          <a:p>
+            <a:pPr algn="ctr"/>
+            <a:r>
+              <a:rPr lang="en-AU" sz="2000" dirty="0">
+                <a:solidFill>
+                  <a:schemeClr val="tx1"/>
+                </a:solidFill>
+              </a:rPr>
+              <a:t>Story Points</a:t>
+            </a:r>
+          </a:p>
+        </p:txBody>
+      </p:sp>
+      <p:sp>
+        <p:nvSpPr>
+          <p:cNvPr id="12" name="Rectangle 11"/>
+          <p:cNvSpPr/>
+          <p:nvPr/>
+        </p:nvSpPr>
+        <p:spPr>
+          <a:xfrm>
+            <a:off x="9426153" y="109410"/>
+            <a:ext cx="792000" cy="540000"/>
+          </a:xfrm>
+          <a:prstGeom prst="rect">
+            <a:avLst/>
+          </a:prstGeom>
+          <a:solidFill>
+            <a:schemeClr val="accent4">
+              <a:lumMod val="20000"/>
+              <a:lumOff val="80000"/>
+            </a:schemeClr>
+          </a:solidFill>
+          <a:ln>
+            <a:solidFill>
+              <a:schemeClr val="accent1">
+                <a:lumMod val="50000"/>
+              </a:schemeClr>
+            </a:solidFill>
+          </a:ln>
+        </p:spPr>
+        <p:style>
+          <a:lnRef idx="2">
+            <a:schemeClr val="accent1">
+              <a:shade val="50000"/>
+            </a:schemeClr>
+          </a:lnRef>
+          <a:fillRef idx="1">
+            <a:schemeClr val="accent1"/>
+          </a:fillRef>
+          <a:effectRef idx="0">
+            <a:schemeClr val="accent1"/>
+          </a:effectRef>
+          <a:fontRef idx="minor">
+            <a:schemeClr val="lt1"/>
+          </a:fontRef>
+        </p:style>
+        <p:txBody>
+          <a:bodyPr wrap="none" lIns="0" rIns="0" rtlCol="0" anchor="ctr"/>
+          <a:lstStyle/>
+          <a:p>
+            <a:pPr algn="ctr"/>
+            <a:r>
+              <a:rPr lang="en-AU" sz="2000" dirty="0">
+                <a:solidFill>
+                  <a:schemeClr val="tx1"/>
+                </a:solidFill>
+              </a:rPr>
+              <a:t>Priority</a:t>
+            </a:r>
+          </a:p>
+          <a:p>
+            <a:pPr algn="ctr"/>
+            <a:r>
+              <a:rPr lang="en-AU" sz="2000" dirty="0">
+                <a:solidFill>
+                  <a:schemeClr val="tx1"/>
+                </a:solidFill>
+              </a:rPr>
+              <a:t>M</a:t>
+            </a:r>
+          </a:p>
+        </p:txBody>
+      </p:sp>
+      <p:sp>
+        <p:nvSpPr>
+          <p:cNvPr id="13" name="Rectangle 12"/>
+          <p:cNvSpPr/>
+          <p:nvPr/>
+        </p:nvSpPr>
+        <p:spPr>
+          <a:xfrm>
+            <a:off x="1182153" y="5128590"/>
+            <a:ext cx="9828000" cy="1620000"/>
+          </a:xfrm>
+          <a:prstGeom prst="rect">
+            <a:avLst/>
+          </a:prstGeom>
+          <a:solidFill>
+            <a:schemeClr val="bg1"/>
+          </a:solidFill>
+          <a:ln>
+            <a:solidFill>
+              <a:schemeClr val="accent1">
+                <a:lumMod val="50000"/>
+              </a:schemeClr>
+            </a:solidFill>
+          </a:ln>
+        </p:spPr>
+        <p:style>
+          <a:lnRef idx="2">
+            <a:schemeClr val="accent1">
+              <a:shade val="50000"/>
+            </a:schemeClr>
+          </a:lnRef>
+          <a:fillRef idx="1">
+            <a:schemeClr val="accent1"/>
+          </a:fillRef>
+          <a:effectRef idx="0">
+            <a:schemeClr val="accent1"/>
+          </a:effectRef>
+          <a:fontRef idx="minor">
+            <a:schemeClr val="lt1"/>
+          </a:fontRef>
+        </p:style>
+        <p:txBody>
+          <a:bodyPr tIns="36000" rtlCol="0" anchor="t" anchorCtr="0"/>
+          <a:lstStyle/>
+          <a:p>
+            <a:r>
+              <a:rPr lang="en-AU" sz="2000" dirty="0">
+                <a:solidFill>
+                  <a:schemeClr val="tx1"/>
+                </a:solidFill>
+              </a:rPr>
+              <a:t>Notes</a:t>
+            </a:r>
+          </a:p>
+          <a:p>
+            <a:pPr marL="179388" indent="-179388">
+              <a:buFont typeface="Arial" pitchFamily="34" charset="0"/>
+              <a:buChar char="•"/>
+            </a:pPr>
+            <a:r>
+              <a:rPr lang="en-AU" sz="2000" dirty="0">
+                <a:solidFill>
+                  <a:schemeClr val="tx1"/>
+                </a:solidFill>
+              </a:rPr>
+              <a:t> The tutors should be able to see this as well</a:t>
+            </a:r>
+          </a:p>
+        </p:txBody>
+      </p:sp>
+    </p:spTree>
+    <p:extLst>
+      <p:ext uri="{BB962C8B-B14F-4D97-AF65-F5344CB8AC3E}">
+        <p14:creationId xmlns:p14="http://schemas.microsoft.com/office/powerpoint/2010/main" val="344383312"/>
+      </p:ext>
+    </p:extLst>
+  </p:cSld>
+  <p:clrMapOvr>
+    <a:masterClrMapping/>
+  </p:clrMapOvr>
+</p:sld>
+</file>
+
+<file path=ppt/slides/slide14.xml><?xml version="1.0" encoding="utf-8"?>
+<p:sld xmlns:a="http://schemas.openxmlformats.org/drawingml/2006/main" xmlns:r="http://schemas.openxmlformats.org/officeDocument/2006/relationships" xmlns:p="http://schemas.openxmlformats.org/presentationml/2006/main">
+  <p:cSld>
+    <p:spTree>
+      <p:nvGrpSpPr>
+        <p:cNvPr id="1" name=""/>
+        <p:cNvGrpSpPr/>
+        <p:nvPr/>
+      </p:nvGrpSpPr>
+      <p:grpSpPr>
+        <a:xfrm>
+          <a:off x="0" y="0"/>
+          <a:ext cx="0" cy="0"/>
+          <a:chOff x="0" y="0"/>
+          <a:chExt cx="0" cy="0"/>
+        </a:xfrm>
+      </p:grpSpPr>
+      <p:sp>
+        <p:nvSpPr>
+          <p:cNvPr id="4" name="Rectangle 3"/>
+          <p:cNvSpPr/>
+          <p:nvPr/>
+        </p:nvSpPr>
+        <p:spPr>
+          <a:xfrm>
+            <a:off x="1182153" y="109410"/>
+            <a:ext cx="720000" cy="540000"/>
+          </a:xfrm>
+          <a:prstGeom prst="rect">
+            <a:avLst/>
+          </a:prstGeom>
+          <a:solidFill>
+            <a:schemeClr val="accent1">
+              <a:lumMod val="40000"/>
+              <a:lumOff val="60000"/>
+            </a:schemeClr>
+          </a:solidFill>
+          <a:ln>
+            <a:solidFill>
+              <a:schemeClr val="accent1">
+                <a:lumMod val="50000"/>
+              </a:schemeClr>
+            </a:solidFill>
+          </a:ln>
+        </p:spPr>
+        <p:style>
+          <a:lnRef idx="2">
+            <a:schemeClr val="accent1">
+              <a:shade val="50000"/>
+            </a:schemeClr>
+          </a:lnRef>
+          <a:fillRef idx="1">
+            <a:schemeClr val="accent1"/>
+          </a:fillRef>
+          <a:effectRef idx="0">
+            <a:schemeClr val="accent1"/>
+          </a:effectRef>
+          <a:fontRef idx="minor">
+            <a:schemeClr val="lt1"/>
+          </a:fontRef>
+        </p:style>
+        <p:txBody>
+          <a:bodyPr wrap="square" lIns="0" rIns="0" rtlCol="0" anchor="ctr"/>
+          <a:lstStyle/>
+          <a:p>
+            <a:pPr algn="ctr"/>
+            <a:r>
+              <a:rPr lang="en-AU" sz="2000" dirty="0">
+                <a:solidFill>
+                  <a:schemeClr val="tx1"/>
+                </a:solidFill>
+              </a:rPr>
+              <a:t>Story ID 0</a:t>
+            </a:r>
+          </a:p>
+        </p:txBody>
+      </p:sp>
+      <p:sp>
+        <p:nvSpPr>
+          <p:cNvPr id="6" name="Rectangle 5"/>
+          <p:cNvSpPr/>
+          <p:nvPr/>
+        </p:nvSpPr>
+        <p:spPr>
+          <a:xfrm>
+            <a:off x="1974153" y="109410"/>
+            <a:ext cx="7380000" cy="540000"/>
+          </a:xfrm>
+          <a:prstGeom prst="rect">
+            <a:avLst/>
+          </a:prstGeom>
+          <a:ln>
+            <a:solidFill>
+              <a:schemeClr val="accent1">
+                <a:lumMod val="50000"/>
+              </a:schemeClr>
+            </a:solidFill>
+          </a:ln>
+        </p:spPr>
+        <p:style>
+          <a:lnRef idx="2">
+            <a:schemeClr val="accent1">
+              <a:shade val="50000"/>
+            </a:schemeClr>
+          </a:lnRef>
+          <a:fillRef idx="1">
+            <a:schemeClr val="accent1"/>
+          </a:fillRef>
+          <a:effectRef idx="0">
+            <a:schemeClr val="accent1"/>
+          </a:effectRef>
+          <a:fontRef idx="minor">
+            <a:schemeClr val="lt1"/>
+          </a:fontRef>
+        </p:style>
+        <p:txBody>
+          <a:bodyPr rtlCol="0" anchor="ctr"/>
+          <a:lstStyle/>
+          <a:p>
+            <a:pPr algn="ctr"/>
+            <a:r>
+              <a:rPr lang="en-AU" sz="2800" dirty="0"/>
+              <a:t>Mark Assessments</a:t>
+            </a:r>
+          </a:p>
+        </p:txBody>
+      </p:sp>
+      <p:sp>
+        <p:nvSpPr>
+          <p:cNvPr id="7" name="Rectangle 6"/>
+          <p:cNvSpPr/>
+          <p:nvPr/>
+        </p:nvSpPr>
+        <p:spPr>
+          <a:xfrm>
+            <a:off x="1182153" y="822470"/>
+            <a:ext cx="9828000" cy="2340000"/>
+          </a:xfrm>
+          <a:prstGeom prst="rect">
+            <a:avLst/>
+          </a:prstGeom>
+          <a:solidFill>
+            <a:schemeClr val="tx2">
+              <a:lumMod val="20000"/>
+              <a:lumOff val="80000"/>
+            </a:schemeClr>
+          </a:solidFill>
+          <a:ln>
+            <a:solidFill>
+              <a:schemeClr val="accent1">
+                <a:lumMod val="50000"/>
+              </a:schemeClr>
+            </a:solidFill>
+          </a:ln>
+        </p:spPr>
+        <p:style>
+          <a:lnRef idx="2">
+            <a:schemeClr val="accent1">
+              <a:shade val="50000"/>
+            </a:schemeClr>
+          </a:lnRef>
+          <a:fillRef idx="1">
+            <a:schemeClr val="accent1"/>
+          </a:fillRef>
+          <a:effectRef idx="0">
+            <a:schemeClr val="accent1"/>
+          </a:effectRef>
+          <a:fontRef idx="minor">
+            <a:schemeClr val="lt1"/>
+          </a:fontRef>
+        </p:style>
+        <p:txBody>
+          <a:bodyPr rtlCol="0" anchor="t" anchorCtr="0"/>
+          <a:lstStyle/>
+          <a:p>
+            <a:r>
+              <a:rPr lang="en-US" altLang="ko-KR" sz="2400" dirty="0">
+                <a:solidFill>
+                  <a:schemeClr val="tx1"/>
+                </a:solidFill>
+              </a:rPr>
+              <a:t>As the unit coordinator, I want to be able to mark groups/individuals for different assessment so that the marks can be released later</a:t>
+            </a:r>
+            <a:endParaRPr lang="ko-KR" altLang="en-US" sz="2400" dirty="0">
+              <a:solidFill>
+                <a:schemeClr val="tx1"/>
+              </a:solidFill>
+            </a:endParaRPr>
+          </a:p>
+          <a:p>
+            <a:endParaRPr lang="en-AU" sz="2400" dirty="0">
+              <a:solidFill>
+                <a:schemeClr val="tx1"/>
+              </a:solidFill>
+            </a:endParaRPr>
+          </a:p>
+        </p:txBody>
+      </p:sp>
+      <p:sp>
+        <p:nvSpPr>
+          <p:cNvPr id="8" name="Rectangle 7"/>
+          <p:cNvSpPr/>
+          <p:nvPr/>
+        </p:nvSpPr>
+        <p:spPr>
+          <a:xfrm>
+            <a:off x="1182153" y="3335530"/>
+            <a:ext cx="9828000" cy="1620000"/>
+          </a:xfrm>
+          <a:prstGeom prst="rect">
+            <a:avLst/>
+          </a:prstGeom>
+          <a:solidFill>
+            <a:schemeClr val="accent1">
+              <a:lumMod val="20000"/>
+              <a:lumOff val="80000"/>
+            </a:schemeClr>
+          </a:solidFill>
+          <a:ln>
+            <a:solidFill>
+              <a:schemeClr val="accent1">
+                <a:lumMod val="50000"/>
+              </a:schemeClr>
+            </a:solidFill>
+          </a:ln>
+        </p:spPr>
+        <p:style>
+          <a:lnRef idx="2">
+            <a:schemeClr val="accent1">
+              <a:shade val="50000"/>
+            </a:schemeClr>
+          </a:lnRef>
+          <a:fillRef idx="1">
+            <a:schemeClr val="accent1"/>
+          </a:fillRef>
+          <a:effectRef idx="0">
+            <a:schemeClr val="accent1"/>
+          </a:effectRef>
+          <a:fontRef idx="minor">
+            <a:schemeClr val="lt1"/>
+          </a:fontRef>
+        </p:style>
+        <p:txBody>
+          <a:bodyPr tIns="36000" rtlCol="0" anchor="t" anchorCtr="0"/>
+          <a:lstStyle/>
+          <a:p>
+            <a:r>
+              <a:rPr lang="en-AU" sz="2000" dirty="0">
+                <a:solidFill>
+                  <a:schemeClr val="tx1"/>
+                </a:solidFill>
+              </a:rPr>
+              <a:t>Acceptance Criteria</a:t>
+            </a:r>
+          </a:p>
+          <a:p>
+            <a:pPr marL="342900" indent="-342900">
+              <a:buFont typeface="Arial" panose="020B0604020202020204" pitchFamily="34" charset="0"/>
+              <a:buChar char="•"/>
+            </a:pPr>
+            <a:r>
+              <a:rPr lang="en-AU" sz="2000" dirty="0">
+                <a:solidFill>
+                  <a:schemeClr val="tx1"/>
+                </a:solidFill>
+              </a:rPr>
+              <a:t>The unit coordinator should be able to mark assessments </a:t>
+            </a:r>
+          </a:p>
+        </p:txBody>
+      </p:sp>
+      <p:sp>
+        <p:nvSpPr>
+          <p:cNvPr id="11" name="Rectangle 10"/>
+          <p:cNvSpPr/>
+          <p:nvPr/>
+        </p:nvSpPr>
+        <p:spPr>
+          <a:xfrm>
+            <a:off x="10290153" y="109410"/>
+            <a:ext cx="720000" cy="540000"/>
+          </a:xfrm>
+          <a:prstGeom prst="rect">
+            <a:avLst/>
+          </a:prstGeom>
+          <a:solidFill>
+            <a:srgbClr val="CCF0CD">
+              <a:alpha val="20000"/>
+            </a:srgbClr>
+          </a:solidFill>
+          <a:ln>
+            <a:solidFill>
+              <a:schemeClr val="accent1">
+                <a:lumMod val="50000"/>
+              </a:schemeClr>
+            </a:solidFill>
+          </a:ln>
+        </p:spPr>
+        <p:style>
+          <a:lnRef idx="2">
+            <a:schemeClr val="accent1">
+              <a:shade val="50000"/>
+            </a:schemeClr>
+          </a:lnRef>
+          <a:fillRef idx="1">
+            <a:schemeClr val="accent1"/>
+          </a:fillRef>
+          <a:effectRef idx="0">
+            <a:schemeClr val="accent1"/>
+          </a:effectRef>
+          <a:fontRef idx="minor">
+            <a:schemeClr val="lt1"/>
+          </a:fontRef>
+        </p:style>
+        <p:txBody>
+          <a:bodyPr wrap="square" lIns="0" rIns="0" rtlCol="0" anchor="ctr"/>
+          <a:lstStyle/>
+          <a:p>
+            <a:pPr algn="ctr"/>
+            <a:r>
+              <a:rPr lang="en-AU" sz="2000" dirty="0">
+                <a:solidFill>
+                  <a:schemeClr val="tx1"/>
+                </a:solidFill>
+              </a:rPr>
+              <a:t>Story Points</a:t>
+            </a:r>
+          </a:p>
+        </p:txBody>
+      </p:sp>
+      <p:sp>
+        <p:nvSpPr>
+          <p:cNvPr id="12" name="Rectangle 11"/>
+          <p:cNvSpPr/>
+          <p:nvPr/>
+        </p:nvSpPr>
+        <p:spPr>
+          <a:xfrm>
+            <a:off x="9426153" y="109410"/>
+            <a:ext cx="792000" cy="540000"/>
+          </a:xfrm>
+          <a:prstGeom prst="rect">
+            <a:avLst/>
+          </a:prstGeom>
+          <a:solidFill>
+            <a:schemeClr val="accent4">
+              <a:lumMod val="20000"/>
+              <a:lumOff val="80000"/>
+            </a:schemeClr>
+          </a:solidFill>
+          <a:ln>
+            <a:solidFill>
+              <a:schemeClr val="accent1">
+                <a:lumMod val="50000"/>
+              </a:schemeClr>
+            </a:solidFill>
+          </a:ln>
+        </p:spPr>
+        <p:style>
+          <a:lnRef idx="2">
+            <a:schemeClr val="accent1">
+              <a:shade val="50000"/>
+            </a:schemeClr>
+          </a:lnRef>
+          <a:fillRef idx="1">
+            <a:schemeClr val="accent1"/>
+          </a:fillRef>
+          <a:effectRef idx="0">
+            <a:schemeClr val="accent1"/>
+          </a:effectRef>
+          <a:fontRef idx="minor">
+            <a:schemeClr val="lt1"/>
+          </a:fontRef>
+        </p:style>
+        <p:txBody>
+          <a:bodyPr wrap="none" lIns="0" rIns="0" rtlCol="0" anchor="ctr"/>
+          <a:lstStyle/>
+          <a:p>
+            <a:pPr algn="ctr"/>
+            <a:r>
+              <a:rPr lang="en-AU" sz="2000" dirty="0">
+                <a:solidFill>
+                  <a:schemeClr val="tx1"/>
+                </a:solidFill>
+              </a:rPr>
+              <a:t>Priority</a:t>
+            </a:r>
+          </a:p>
+          <a:p>
+            <a:pPr algn="ctr"/>
+            <a:r>
+              <a:rPr lang="en-AU" sz="2000" dirty="0">
+                <a:solidFill>
+                  <a:schemeClr val="tx1"/>
+                </a:solidFill>
+              </a:rPr>
+              <a:t>M</a:t>
+            </a:r>
+          </a:p>
+        </p:txBody>
+      </p:sp>
+      <p:sp>
+        <p:nvSpPr>
+          <p:cNvPr id="13" name="Rectangle 12"/>
+          <p:cNvSpPr/>
+          <p:nvPr/>
+        </p:nvSpPr>
+        <p:spPr>
+          <a:xfrm>
+            <a:off x="1182153" y="5128590"/>
+            <a:ext cx="9828000" cy="1620000"/>
+          </a:xfrm>
+          <a:prstGeom prst="rect">
+            <a:avLst/>
+          </a:prstGeom>
+          <a:solidFill>
+            <a:schemeClr val="bg1"/>
+          </a:solidFill>
+          <a:ln>
+            <a:solidFill>
+              <a:schemeClr val="accent1">
+                <a:lumMod val="50000"/>
+              </a:schemeClr>
+            </a:solidFill>
+          </a:ln>
+        </p:spPr>
+        <p:style>
+          <a:lnRef idx="2">
+            <a:schemeClr val="accent1">
+              <a:shade val="50000"/>
+            </a:schemeClr>
+          </a:lnRef>
+          <a:fillRef idx="1">
+            <a:schemeClr val="accent1"/>
+          </a:fillRef>
+          <a:effectRef idx="0">
+            <a:schemeClr val="accent1"/>
+          </a:effectRef>
+          <a:fontRef idx="minor">
+            <a:schemeClr val="lt1"/>
+          </a:fontRef>
+        </p:style>
+        <p:txBody>
+          <a:bodyPr tIns="36000" rtlCol="0" anchor="t" anchorCtr="0"/>
+          <a:lstStyle/>
+          <a:p>
+            <a:r>
+              <a:rPr lang="en-AU" sz="2000" dirty="0">
+                <a:solidFill>
+                  <a:schemeClr val="tx1"/>
+                </a:solidFill>
+              </a:rPr>
+              <a:t>Notes</a:t>
+            </a:r>
+          </a:p>
+          <a:p>
+            <a:pPr marL="179388" indent="-179388">
+              <a:buFont typeface="Arial" pitchFamily="34" charset="0"/>
+              <a:buChar char="•"/>
+            </a:pPr>
+            <a:r>
+              <a:rPr lang="en-AU" sz="2000" dirty="0">
+                <a:solidFill>
+                  <a:schemeClr val="tx1"/>
+                </a:solidFill>
+              </a:rPr>
+              <a:t> Marks will be released later at the coordinators discretion</a:t>
+            </a:r>
+          </a:p>
+          <a:p>
+            <a:pPr marL="179388" indent="-179388">
+              <a:buFont typeface="Arial" pitchFamily="34" charset="0"/>
+              <a:buChar char="•"/>
+            </a:pPr>
+            <a:r>
+              <a:rPr lang="en-AU" sz="2000" dirty="0">
+                <a:solidFill>
+                  <a:schemeClr val="tx1"/>
+                </a:solidFill>
+              </a:rPr>
+              <a:t>Tutors should be able to do the same, but only the coordinator gets to decide whether and when to release the marks</a:t>
+            </a:r>
+          </a:p>
+        </p:txBody>
+      </p:sp>
+    </p:spTree>
+    <p:extLst>
+      <p:ext uri="{BB962C8B-B14F-4D97-AF65-F5344CB8AC3E}">
+        <p14:creationId xmlns:p14="http://schemas.microsoft.com/office/powerpoint/2010/main" val="3161105411"/>
+      </p:ext>
+    </p:extLst>
+  </p:cSld>
+  <p:clrMapOvr>
+    <a:masterClrMapping/>
+  </p:clrMapOvr>
+</p:sld>
+</file>
+
+<file path=ppt/slides/slide15.xml><?xml version="1.0" encoding="utf-8"?>
+<p:sld xmlns:a="http://schemas.openxmlformats.org/drawingml/2006/main" xmlns:r="http://schemas.openxmlformats.org/officeDocument/2006/relationships" xmlns:p="http://schemas.openxmlformats.org/presentationml/2006/main">
+  <p:cSld>
+    <p:spTree>
+      <p:nvGrpSpPr>
+        <p:cNvPr id="1" name=""/>
+        <p:cNvGrpSpPr/>
+        <p:nvPr/>
+      </p:nvGrpSpPr>
+      <p:grpSpPr>
+        <a:xfrm>
+          <a:off x="0" y="0"/>
+          <a:ext cx="0" cy="0"/>
+          <a:chOff x="0" y="0"/>
+          <a:chExt cx="0" cy="0"/>
+        </a:xfrm>
+      </p:grpSpPr>
+      <p:sp>
+        <p:nvSpPr>
+          <p:cNvPr id="4" name="Rectangle 3"/>
+          <p:cNvSpPr/>
+          <p:nvPr/>
+        </p:nvSpPr>
+        <p:spPr>
+          <a:xfrm>
+            <a:off x="1182153" y="109410"/>
+            <a:ext cx="720000" cy="540000"/>
+          </a:xfrm>
+          <a:prstGeom prst="rect">
+            <a:avLst/>
+          </a:prstGeom>
+          <a:solidFill>
+            <a:schemeClr val="accent1">
+              <a:lumMod val="40000"/>
+              <a:lumOff val="60000"/>
+            </a:schemeClr>
+          </a:solidFill>
+          <a:ln>
+            <a:solidFill>
+              <a:schemeClr val="accent1">
+                <a:lumMod val="50000"/>
+              </a:schemeClr>
+            </a:solidFill>
+          </a:ln>
+        </p:spPr>
+        <p:style>
+          <a:lnRef idx="2">
+            <a:schemeClr val="accent1">
+              <a:shade val="50000"/>
+            </a:schemeClr>
+          </a:lnRef>
+          <a:fillRef idx="1">
+            <a:schemeClr val="accent1"/>
+          </a:fillRef>
+          <a:effectRef idx="0">
+            <a:schemeClr val="accent1"/>
+          </a:effectRef>
+          <a:fontRef idx="minor">
+            <a:schemeClr val="lt1"/>
+          </a:fontRef>
+        </p:style>
+        <p:txBody>
+          <a:bodyPr wrap="square" lIns="0" rIns="0" rtlCol="0" anchor="ctr"/>
+          <a:lstStyle/>
+          <a:p>
+            <a:pPr algn="ctr"/>
+            <a:r>
+              <a:rPr lang="en-AU" sz="2000" dirty="0">
+                <a:solidFill>
+                  <a:schemeClr val="tx1"/>
+                </a:solidFill>
+              </a:rPr>
+              <a:t>Story ID 0</a:t>
+            </a:r>
+          </a:p>
+        </p:txBody>
+      </p:sp>
+      <p:sp>
+        <p:nvSpPr>
+          <p:cNvPr id="6" name="Rectangle 5"/>
+          <p:cNvSpPr/>
+          <p:nvPr/>
+        </p:nvSpPr>
+        <p:spPr>
+          <a:xfrm>
+            <a:off x="1974153" y="109410"/>
+            <a:ext cx="7380000" cy="540000"/>
+          </a:xfrm>
+          <a:prstGeom prst="rect">
+            <a:avLst/>
+          </a:prstGeom>
+          <a:ln>
+            <a:solidFill>
+              <a:schemeClr val="accent1">
+                <a:lumMod val="50000"/>
+              </a:schemeClr>
+            </a:solidFill>
+          </a:ln>
+        </p:spPr>
+        <p:style>
+          <a:lnRef idx="2">
+            <a:schemeClr val="accent1">
+              <a:shade val="50000"/>
+            </a:schemeClr>
+          </a:lnRef>
+          <a:fillRef idx="1">
+            <a:schemeClr val="accent1"/>
+          </a:fillRef>
+          <a:effectRef idx="0">
+            <a:schemeClr val="accent1"/>
+          </a:effectRef>
+          <a:fontRef idx="minor">
+            <a:schemeClr val="lt1"/>
+          </a:fontRef>
+        </p:style>
+        <p:txBody>
+          <a:bodyPr rtlCol="0" anchor="ctr"/>
+          <a:lstStyle/>
+          <a:p>
+            <a:pPr algn="ctr"/>
+            <a:r>
+              <a:rPr lang="en-AU" sz="2800" dirty="0"/>
+              <a:t>Cohorts View/Edit</a:t>
+            </a:r>
+          </a:p>
+        </p:txBody>
+      </p:sp>
+      <p:sp>
+        <p:nvSpPr>
+          <p:cNvPr id="7" name="Rectangle 6"/>
+          <p:cNvSpPr/>
+          <p:nvPr/>
+        </p:nvSpPr>
+        <p:spPr>
+          <a:xfrm>
+            <a:off x="1182153" y="822470"/>
+            <a:ext cx="9828000" cy="2340000"/>
+          </a:xfrm>
+          <a:prstGeom prst="rect">
+            <a:avLst/>
+          </a:prstGeom>
+          <a:solidFill>
+            <a:schemeClr val="tx2">
+              <a:lumMod val="20000"/>
+              <a:lumOff val="80000"/>
+            </a:schemeClr>
+          </a:solidFill>
+          <a:ln>
+            <a:solidFill>
+              <a:schemeClr val="accent1">
+                <a:lumMod val="50000"/>
+              </a:schemeClr>
+            </a:solidFill>
+          </a:ln>
+        </p:spPr>
+        <p:style>
+          <a:lnRef idx="2">
+            <a:schemeClr val="accent1">
+              <a:shade val="50000"/>
+            </a:schemeClr>
+          </a:lnRef>
+          <a:fillRef idx="1">
+            <a:schemeClr val="accent1"/>
+          </a:fillRef>
+          <a:effectRef idx="0">
+            <a:schemeClr val="accent1"/>
+          </a:effectRef>
+          <a:fontRef idx="minor">
+            <a:schemeClr val="lt1"/>
+          </a:fontRef>
+        </p:style>
+        <p:txBody>
+          <a:bodyPr rtlCol="0" anchor="t" anchorCtr="0"/>
+          <a:lstStyle/>
+          <a:p>
+            <a:r>
+              <a:rPr lang="en-US" altLang="ko-KR" sz="2400" dirty="0">
+                <a:solidFill>
+                  <a:schemeClr val="tx1"/>
+                </a:solidFill>
+              </a:rPr>
+              <a:t>As the unit coordinator, I want to be able to view/edit cohorts so that I can see which teams and students are in which cohort as well as which coordinator/tutor is working on which cohort</a:t>
             </a:r>
             <a:endParaRPr lang="ko-KR" altLang="en-US" sz="2400" dirty="0">
               <a:solidFill>
@@ -6095,7 +7172,7 @@
 </p:sld>
 </file>
 
-<file path=ppt/slides/slide14.xml><?xml version="1.0" encoding="utf-8"?>
+<file path=ppt/slides/slide16.xml><?xml version="1.0" encoding="utf-8"?>
 <p:sld xmlns:a="http://schemas.openxmlformats.org/drawingml/2006/main" xmlns:r="http://schemas.openxmlformats.org/officeDocument/2006/relationships" xmlns:p="http://schemas.openxmlformats.org/presentationml/2006/main">
   <p:cSld>
     <p:spTree>
@@ -6730,7 +7807,7 @@
             <a:pPr algn="ctr"/>
             <a:r>
               <a:rPr lang="en-AU" sz="2800" dirty="0"/>
-              <a:t>Add students</a:t>
+              <a:t>Log out</a:t>
             </a:r>
           </a:p>
         </p:txBody>
@@ -6784,21 +7861,26 @@
           <a:lstStyle/>
           <a:p>
             <a:r>
-              <a:rPr lang="en-US" altLang="ko-KR" sz="2400" dirty="0">
-                <a:solidFill>
-                  <a:schemeClr val="tx1"/>
-                </a:solidFill>
-              </a:rPr>
-              <a:t>As the unit coordinator, I want to be able to add a student in case of late enrollment so that the student can be allocated to a team later</a:t>
-            </a:r>
-            <a:endParaRPr lang="en-AU" altLang="ko-KR" sz="2400" dirty="0">
+              <a:rPr lang="en-AU" sz="2400" dirty="0">
+                <a:solidFill>
+                  <a:schemeClr val="tx1"/>
+                </a:solidFill>
+              </a:rPr>
+              <a:t>As the unit coordinator, I want to be able to log out so that I can close the </a:t>
+            </a:r>
+            <a:r>
+              <a:rPr lang="en-AU" sz="2400">
+                <a:solidFill>
+                  <a:schemeClr val="tx1"/>
+                </a:solidFill>
+              </a:rPr>
+              <a:t>website securely </a:t>
+            </a:r>
+            <a:endParaRPr lang="en-AU" sz="2400" dirty="0">
               <a:solidFill>
                 <a:schemeClr val="tx1"/>
               </a:solidFill>
             </a:endParaRPr>
-          </a:p>
-          <a:p>
-            <a:endParaRPr lang="en-AU" altLang="ko-KR" sz="2400" dirty="0"/>
           </a:p>
         </p:txBody>
       </p:sp>
@@ -6851,7 +7933,7 @@
           <a:lstStyle/>
           <a:p>
             <a:r>
-              <a:rPr lang="en-AU" altLang="ko-KR" sz="2000" dirty="0">
+              <a:rPr lang="en-AU" sz="2000" dirty="0">
                 <a:solidFill>
                   <a:schemeClr val="tx1"/>
                 </a:solidFill>
@@ -6865,20 +7947,13 @@
               <a:buChar char="•"/>
             </a:pPr>
             <a:r>
-              <a:rPr lang="en-AU" altLang="ko-KR" sz="2000" dirty="0">
-                <a:solidFill>
-                  <a:schemeClr val="tx1"/>
-                </a:solidFill>
-              </a:rPr>
-              <a:t>Add a function that will allow the coordinator to add a student to the system</a:t>
-            </a:r>
-          </a:p>
-          <a:p>
-            <a:endParaRPr lang="en-AU" sz="2000" dirty="0">
-              <a:solidFill>
-                <a:schemeClr val="tx1"/>
-              </a:solidFill>
-            </a:endParaRPr>
+              <a:rPr lang="en-AU" sz="2000" dirty="0">
+                <a:solidFill>
+                  <a:schemeClr val="tx1"/>
+                </a:solidFill>
+              </a:rPr>
+              <a:t>Add a log out function</a:t>
+            </a:r>
           </a:p>
         </p:txBody>
       </p:sp>
@@ -7085,7 +8160,7 @@
     </p:spTree>
     <p:extLst>
       <p:ext uri="{BB962C8B-B14F-4D97-AF65-F5344CB8AC3E}">
-        <p14:creationId xmlns:p14="http://schemas.microsoft.com/office/powerpoint/2010/main" val="4052645052"/>
+        <p14:creationId xmlns:p14="http://schemas.microsoft.com/office/powerpoint/2010/main" val="1212842850"/>
       </p:ext>
     </p:extLst>
   </p:cSld>
@@ -7217,7 +8292,7 @@
             <a:pPr algn="ctr"/>
             <a:r>
               <a:rPr lang="en-AU" sz="2800" dirty="0"/>
-              <a:t>Industry Partner Registration</a:t>
+              <a:t>Student Details</a:t>
             </a:r>
           </a:p>
         </p:txBody>
@@ -7271,130 +8346,13 @@
           <a:lstStyle/>
           <a:p>
             <a:r>
-              <a:rPr lang="en-US" altLang="ko-KR" sz="2400" dirty="0">
-                <a:solidFill>
-                  <a:schemeClr val="tx1"/>
-                </a:solidFill>
-              </a:rPr>
-              <a:t>As</a:t>
-            </a:r>
-            <a:r>
-              <a:rPr lang="ko-KR" altLang="en-US" sz="2400" dirty="0">
-                <a:solidFill>
-                  <a:schemeClr val="tx1"/>
-                </a:solidFill>
-              </a:rPr>
-              <a:t> </a:t>
-            </a:r>
-            <a:r>
-              <a:rPr lang="en-US" altLang="ko-KR" sz="2400" dirty="0">
-                <a:solidFill>
-                  <a:schemeClr val="tx1"/>
-                </a:solidFill>
-              </a:rPr>
-              <a:t>the</a:t>
-            </a:r>
-            <a:r>
-              <a:rPr lang="ko-KR" altLang="en-US" sz="2400" dirty="0">
-                <a:solidFill>
-                  <a:schemeClr val="tx1"/>
-                </a:solidFill>
-              </a:rPr>
-              <a:t> </a:t>
-            </a:r>
-            <a:r>
-              <a:rPr lang="en-US" altLang="ko-KR" sz="2400" dirty="0">
-                <a:solidFill>
-                  <a:schemeClr val="tx1"/>
-                </a:solidFill>
-              </a:rPr>
-              <a:t>unit</a:t>
-            </a:r>
-            <a:r>
-              <a:rPr lang="ko-KR" altLang="en-US" sz="2400" dirty="0">
-                <a:solidFill>
-                  <a:schemeClr val="tx1"/>
-                </a:solidFill>
-              </a:rPr>
-              <a:t> </a:t>
-            </a:r>
-            <a:r>
-              <a:rPr lang="en-US" altLang="ko-KR" sz="2400" dirty="0">
-                <a:solidFill>
-                  <a:schemeClr val="tx1"/>
-                </a:solidFill>
-              </a:rPr>
-              <a:t>coordinator,</a:t>
-            </a:r>
-            <a:r>
-              <a:rPr lang="ko-KR" altLang="en-US" sz="2400" dirty="0">
-                <a:solidFill>
-                  <a:schemeClr val="tx1"/>
-                </a:solidFill>
-              </a:rPr>
-              <a:t> </a:t>
-            </a:r>
-            <a:r>
-              <a:rPr lang="en-US" altLang="ko-KR" sz="2400" dirty="0">
-                <a:solidFill>
-                  <a:schemeClr val="tx1"/>
-                </a:solidFill>
-              </a:rPr>
-              <a:t>I</a:t>
-            </a:r>
-            <a:r>
-              <a:rPr lang="ko-KR" altLang="en-US" sz="2400" dirty="0">
-                <a:solidFill>
-                  <a:schemeClr val="tx1"/>
-                </a:solidFill>
-              </a:rPr>
-              <a:t> </a:t>
-            </a:r>
-            <a:r>
-              <a:rPr lang="en-US" altLang="ko-KR" sz="2400" dirty="0">
-                <a:solidFill>
-                  <a:schemeClr val="tx1"/>
-                </a:solidFill>
-              </a:rPr>
-              <a:t>want</a:t>
-            </a:r>
-            <a:r>
-              <a:rPr lang="ko-KR" altLang="en-US" sz="2400" dirty="0">
-                <a:solidFill>
-                  <a:schemeClr val="tx1"/>
-                </a:solidFill>
-              </a:rPr>
-              <a:t> </a:t>
-            </a:r>
-            <a:r>
-              <a:rPr lang="en-US" altLang="ko-KR" sz="2400" dirty="0">
-                <a:solidFill>
-                  <a:schemeClr val="tx1"/>
-                </a:solidFill>
-              </a:rPr>
-              <a:t>to</a:t>
-            </a:r>
-            <a:r>
-              <a:rPr lang="ko-KR" altLang="en-US" sz="2400" dirty="0">
-                <a:solidFill>
-                  <a:schemeClr val="tx1"/>
-                </a:solidFill>
-              </a:rPr>
-              <a:t> </a:t>
-            </a:r>
-            <a:r>
-              <a:rPr lang="en-US" altLang="ko-KR" sz="2400" dirty="0">
-                <a:solidFill>
-                  <a:schemeClr val="tx1"/>
-                </a:solidFill>
-              </a:rPr>
-              <a:t>be able to sign up industry partners so that they can use the system</a:t>
-            </a:r>
-            <a:endParaRPr lang="en-AU" sz="2400" dirty="0">
-              <a:solidFill>
-                <a:schemeClr val="tx1"/>
-              </a:solidFill>
-            </a:endParaRPr>
+              <a:rPr lang="en-AU" sz="2400" dirty="0">
+                <a:solidFill>
+                  <a:schemeClr val="tx1"/>
+                </a:solidFill>
+              </a:rPr>
+              <a:t>As the unit coordinator, I want to be able to see student details so that I can see if there is an issue with student details</a:t>
+            </a:r>
           </a:p>
         </p:txBody>
       </p:sp>
@@ -7461,20 +8419,13 @@
               <a:buChar char="•"/>
             </a:pPr>
             <a:r>
-              <a:rPr lang="en-AU" altLang="ko-KR" sz="2000" dirty="0">
-                <a:solidFill>
-                  <a:schemeClr val="tx1"/>
-                </a:solidFill>
-              </a:rPr>
-              <a:t>Add a function that will add an industry partner upon sign up</a:t>
-            </a:r>
-          </a:p>
-          <a:p>
-            <a:endParaRPr lang="en-AU" sz="2000" dirty="0">
-              <a:solidFill>
-                <a:schemeClr val="tx1"/>
-              </a:solidFill>
-            </a:endParaRPr>
+              <a:rPr lang="en-AU" sz="2000" dirty="0">
+                <a:solidFill>
+                  <a:schemeClr val="tx1"/>
+                </a:solidFill>
+              </a:rPr>
+              <a:t>Create Student Details Page</a:t>
+            </a:r>
           </a:p>
         </p:txBody>
       </p:sp>
@@ -7673,7 +8624,21 @@
                   <a:schemeClr val="tx1"/>
                 </a:solidFill>
               </a:rPr>
-              <a:t> Will decide whether this function is needed as we develop</a:t>
+              <a:t> The coordinator should be able to see student details including current GPA and Major</a:t>
+            </a:r>
+          </a:p>
+          <a:p>
+            <a:pPr marL="179388" indent="-179388">
+              <a:buFont typeface="Arial" pitchFamily="34" charset="0"/>
+              <a:buChar char="•"/>
+            </a:pPr>
+            <a:r>
+              <a:rPr lang="en-AU" sz="2000" dirty="0">
+                <a:solidFill>
+                  <a:schemeClr val="tx1"/>
+                </a:solidFill>
+              </a:rPr>
+              <a:t>Should be able to see which cohort the student is in as well</a:t>
             </a:r>
           </a:p>
         </p:txBody>
@@ -7681,7 +8646,7 @@
     </p:spTree>
     <p:extLst>
       <p:ext uri="{BB962C8B-B14F-4D97-AF65-F5344CB8AC3E}">
-        <p14:creationId xmlns:p14="http://schemas.microsoft.com/office/powerpoint/2010/main" val="1620574207"/>
+        <p14:creationId xmlns:p14="http://schemas.microsoft.com/office/powerpoint/2010/main" val="3261240586"/>
       </p:ext>
     </p:extLst>
   </p:cSld>
@@ -7813,7 +8778,7 @@
             <a:pPr algn="ctr"/>
             <a:r>
               <a:rPr lang="en-AU" sz="2800" dirty="0"/>
-              <a:t>Remove Students</a:t>
+              <a:t>Add students</a:t>
             </a:r>
           </a:p>
         </p:txBody>
@@ -7872,7 +8837,7 @@
                   <a:schemeClr val="tx1"/>
                 </a:solidFill>
               </a:rPr>
-              <a:t>As the unit coordinator, I want to be able to remove a student so that in case of unit withdrawal, students can be removed from the system</a:t>
+              <a:t>As the unit coordinator, I want to be able to add a student in case of late enrollment so that the student can be allocated to a team later</a:t>
             </a:r>
             <a:endParaRPr lang="en-AU" altLang="ko-KR" sz="2400" dirty="0">
               <a:solidFill>
@@ -7881,11 +8846,7 @@
             </a:endParaRPr>
           </a:p>
           <a:p>
-            <a:endParaRPr lang="en-AU" sz="2400" dirty="0">
-              <a:solidFill>
-                <a:schemeClr val="tx1"/>
-              </a:solidFill>
-            </a:endParaRPr>
+            <a:endParaRPr lang="en-AU" altLang="ko-KR" sz="2400" dirty="0"/>
           </a:p>
         </p:txBody>
       </p:sp>
@@ -7938,7 +8899,7 @@
           <a:lstStyle/>
           <a:p>
             <a:r>
-              <a:rPr lang="en-AU" sz="2000" dirty="0">
+              <a:rPr lang="en-AU" altLang="ko-KR" sz="2000" dirty="0">
                 <a:solidFill>
                   <a:schemeClr val="tx1"/>
                 </a:solidFill>
@@ -7947,18 +8908,25 @@
             </a:r>
           </a:p>
           <a:p>
-            <a:pPr marL="342900" indent="-342900">
-              <a:buFont typeface="Arial" panose="020B0604020202020204" pitchFamily="34" charset="0"/>
+            <a:pPr marL="179388" indent="-179388">
+              <a:buFont typeface="Arial" pitchFamily="34" charset="0"/>
               <a:buChar char="•"/>
             </a:pPr>
             <a:r>
-              <a:rPr lang="en-AU" sz="2000" dirty="0">
-                <a:solidFill>
-                  <a:schemeClr val="tx1"/>
-                </a:solidFill>
-              </a:rPr>
-              <a:t>The coordinator should be able to remove the student from the systems</a:t>
-            </a:r>
+              <a:rPr lang="en-AU" altLang="ko-KR" sz="2000" dirty="0">
+                <a:solidFill>
+                  <a:schemeClr val="tx1"/>
+                </a:solidFill>
+              </a:rPr>
+              <a:t>Add a function that will allow the coordinator to add a student to the system</a:t>
+            </a:r>
+          </a:p>
+          <a:p>
+            <a:endParaRPr lang="en-AU" sz="2000" dirty="0">
+              <a:solidFill>
+                <a:schemeClr val="tx1"/>
+              </a:solidFill>
+            </a:endParaRPr>
           </a:p>
         </p:txBody>
       </p:sp>
@@ -8165,7 +9133,7 @@
     </p:spTree>
     <p:extLst>
       <p:ext uri="{BB962C8B-B14F-4D97-AF65-F5344CB8AC3E}">
-        <p14:creationId xmlns:p14="http://schemas.microsoft.com/office/powerpoint/2010/main" val="1796875348"/>
+        <p14:creationId xmlns:p14="http://schemas.microsoft.com/office/powerpoint/2010/main" val="4052645052"/>
       </p:ext>
     </p:extLst>
   </p:cSld>
@@ -8297,7 +9265,7 @@
             <a:pPr algn="ctr"/>
             <a:r>
               <a:rPr lang="en-AU" sz="2800" dirty="0"/>
-              <a:t>Generate Teams</a:t>
+              <a:t>Industry Partner Registration</a:t>
             </a:r>
           </a:p>
         </p:txBody>
@@ -8356,15 +9324,120 @@
                   <a:schemeClr val="tx1"/>
                 </a:solidFill>
               </a:rPr>
-              <a:t>As the unit coordinator, I want to be able to generate teams for those who haven’t signed up for a team yet so that no one gets left behind without a team</a:t>
-            </a:r>
-            <a:endParaRPr lang="ko-KR" altLang="en-US" sz="2400" dirty="0">
-              <a:solidFill>
-                <a:schemeClr val="tx1"/>
-              </a:solidFill>
-            </a:endParaRPr>
-          </a:p>
-          <a:p>
+              <a:t>As</a:t>
+            </a:r>
+            <a:r>
+              <a:rPr lang="ko-KR" altLang="en-US" sz="2400" dirty="0">
+                <a:solidFill>
+                  <a:schemeClr val="tx1"/>
+                </a:solidFill>
+              </a:rPr>
+              <a:t> </a:t>
+            </a:r>
+            <a:r>
+              <a:rPr lang="en-US" altLang="ko-KR" sz="2400" dirty="0">
+                <a:solidFill>
+                  <a:schemeClr val="tx1"/>
+                </a:solidFill>
+              </a:rPr>
+              <a:t>the</a:t>
+            </a:r>
+            <a:r>
+              <a:rPr lang="ko-KR" altLang="en-US" sz="2400" dirty="0">
+                <a:solidFill>
+                  <a:schemeClr val="tx1"/>
+                </a:solidFill>
+              </a:rPr>
+              <a:t> </a:t>
+            </a:r>
+            <a:r>
+              <a:rPr lang="en-US" altLang="ko-KR" sz="2400" dirty="0">
+                <a:solidFill>
+                  <a:schemeClr val="tx1"/>
+                </a:solidFill>
+              </a:rPr>
+              <a:t>unit</a:t>
+            </a:r>
+            <a:r>
+              <a:rPr lang="ko-KR" altLang="en-US" sz="2400" dirty="0">
+                <a:solidFill>
+                  <a:schemeClr val="tx1"/>
+                </a:solidFill>
+              </a:rPr>
+              <a:t> </a:t>
+            </a:r>
+            <a:r>
+              <a:rPr lang="en-US" altLang="ko-KR" sz="2400" dirty="0">
+                <a:solidFill>
+                  <a:schemeClr val="tx1"/>
+                </a:solidFill>
+              </a:rPr>
+              <a:t>coordinator,</a:t>
+            </a:r>
+            <a:r>
+              <a:rPr lang="ko-KR" altLang="en-US" sz="2400" dirty="0">
+                <a:solidFill>
+                  <a:schemeClr val="tx1"/>
+                </a:solidFill>
+              </a:rPr>
+              <a:t> </a:t>
+            </a:r>
+            <a:r>
+              <a:rPr lang="en-US" altLang="ko-KR" sz="2400" dirty="0">
+                <a:solidFill>
+                  <a:schemeClr val="tx1"/>
+                </a:solidFill>
+              </a:rPr>
+              <a:t>I</a:t>
+            </a:r>
+            <a:r>
+              <a:rPr lang="ko-KR" altLang="en-US" sz="2400" dirty="0">
+                <a:solidFill>
+                  <a:schemeClr val="tx1"/>
+                </a:solidFill>
+              </a:rPr>
+              <a:t> </a:t>
+            </a:r>
+            <a:r>
+              <a:rPr lang="en-US" altLang="ko-KR" sz="2400" dirty="0">
+                <a:solidFill>
+                  <a:schemeClr val="tx1"/>
+                </a:solidFill>
+              </a:rPr>
+              <a:t>want</a:t>
+            </a:r>
+            <a:r>
+              <a:rPr lang="ko-KR" altLang="en-US" sz="2400" dirty="0">
+                <a:solidFill>
+                  <a:schemeClr val="tx1"/>
+                </a:solidFill>
+              </a:rPr>
+              <a:t> </a:t>
+            </a:r>
+            <a:r>
+              <a:rPr lang="en-US" altLang="ko-KR" sz="2400" dirty="0">
+                <a:solidFill>
+                  <a:schemeClr val="tx1"/>
+                </a:solidFill>
+              </a:rPr>
+              <a:t>to</a:t>
+            </a:r>
+            <a:r>
+              <a:rPr lang="ko-KR" altLang="en-US" sz="2400" dirty="0">
+                <a:solidFill>
+                  <a:schemeClr val="tx1"/>
+                </a:solidFill>
+              </a:rPr>
+              <a:t> </a:t>
+            </a:r>
+            <a:r>
+              <a:rPr lang="en-US" altLang="ko-KR" sz="2400" dirty="0">
+                <a:solidFill>
+                  <a:schemeClr val="tx1"/>
+                </a:solidFill>
+              </a:rPr>
+              <a:t>be able to sign up industry partners so that they can use the system</a:t>
+            </a:r>
             <a:endParaRPr lang="en-AU" sz="2400" dirty="0">
               <a:solidFill>
                 <a:schemeClr val="tx1"/>
@@ -8431,24 +9504,20 @@
             </a:r>
           </a:p>
           <a:p>
-            <a:pPr marL="342900" indent="-342900">
-              <a:buFont typeface="Arial" panose="020B0604020202020204" pitchFamily="34" charset="0"/>
+            <a:pPr marL="179388" indent="-179388">
+              <a:buFont typeface="Arial" pitchFamily="34" charset="0"/>
               <a:buChar char="•"/>
             </a:pPr>
             <a:r>
-              <a:rPr lang="en-AU" sz="2000" dirty="0">
-                <a:solidFill>
-                  <a:schemeClr val="tx1"/>
-                </a:solidFill>
-              </a:rPr>
-              <a:t>Add a function that will generate teams automatically</a:t>
-            </a:r>
-          </a:p>
-          <a:p>
-            <a:pPr marL="342900" indent="-342900">
-              <a:buFont typeface="Arial" panose="020B0604020202020204" pitchFamily="34" charset="0"/>
-              <a:buChar char="•"/>
-            </a:pPr>
+              <a:rPr lang="en-AU" altLang="ko-KR" sz="2000" dirty="0">
+                <a:solidFill>
+                  <a:schemeClr val="tx1"/>
+                </a:solidFill>
+              </a:rPr>
+              <a:t>Add a function that will add an industry partner upon sign up</a:t>
+            </a:r>
+          </a:p>
+          <a:p>
             <a:endParaRPr lang="en-AU" sz="2000" dirty="0">
               <a:solidFill>
                 <a:schemeClr val="tx1"/>
@@ -8652,7 +9721,7 @@
                   <a:schemeClr val="tx1"/>
                 </a:solidFill>
               </a:rPr>
-              <a:t> Algorithms for generating teams need to be discussed as we develop</a:t>
+              <a:t> Will decide whether this function is needed as we develop</a:t>
             </a:r>
           </a:p>
         </p:txBody>
@@ -8660,7 +9729,7 @@
     </p:spTree>
     <p:extLst>
       <p:ext uri="{BB962C8B-B14F-4D97-AF65-F5344CB8AC3E}">
-        <p14:creationId xmlns:p14="http://schemas.microsoft.com/office/powerpoint/2010/main" val="276816726"/>
+        <p14:creationId xmlns:p14="http://schemas.microsoft.com/office/powerpoint/2010/main" val="1620574207"/>
       </p:ext>
     </p:extLst>
   </p:cSld>
@@ -8792,7 +9861,7 @@
             <a:pPr algn="ctr"/>
             <a:r>
               <a:rPr lang="en-AU" sz="2800" dirty="0"/>
-              <a:t>Edit Teams</a:t>
+              <a:t>Remove Students</a:t>
             </a:r>
           </a:p>
         </p:txBody>
@@ -8851,9 +9920,9 @@
                   <a:schemeClr val="tx1"/>
                 </a:solidFill>
               </a:rPr>
-              <a:t>As the unit coordinator, I want to be able to edit teams so that a student can be added and/or removed from the team</a:t>
-            </a:r>
-            <a:endParaRPr lang="ko-KR" altLang="en-US" sz="2400" dirty="0">
+              <a:t>As the unit coordinator, I want to be able to remove a student so that in case of unit withdrawal, students can be removed from the system</a:t>
+            </a:r>
+            <a:endParaRPr lang="en-AU" altLang="ko-KR" sz="2400" dirty="0">
               <a:solidFill>
                 <a:schemeClr val="tx1"/>
               </a:solidFill>
@@ -8936,7 +10005,7 @@
                   <a:schemeClr val="tx1"/>
                 </a:solidFill>
               </a:rPr>
-              <a:t>The coordinator should be able to add/remove team members</a:t>
+              <a:t>The coordinator should be able to remove the student from the systems</a:t>
             </a:r>
           </a:p>
         </p:txBody>
@@ -9144,7 +10213,7 @@
     </p:spTree>
     <p:extLst>
       <p:ext uri="{BB962C8B-B14F-4D97-AF65-F5344CB8AC3E}">
-        <p14:creationId xmlns:p14="http://schemas.microsoft.com/office/powerpoint/2010/main" val="3834474679"/>
+        <p14:creationId xmlns:p14="http://schemas.microsoft.com/office/powerpoint/2010/main" val="1796875348"/>
       </p:ext>
     </p:extLst>
   </p:cSld>
@@ -9276,7 +10345,7 @@
             <a:pPr algn="ctr"/>
             <a:r>
               <a:rPr lang="en-AU" sz="2800" dirty="0"/>
-              <a:t>Upload Projects</a:t>
+              <a:t>Generate Teams</a:t>
             </a:r>
           </a:p>
         </p:txBody>
@@ -9335,7 +10404,7 @@
                   <a:schemeClr val="tx1"/>
                 </a:solidFill>
               </a:rPr>
-              <a:t>As the unit coordinator, I want to be able to upload projects so that students can read through the project outline and apply for them later</a:t>
+              <a:t>As the unit coordinator, I want to be able to generate teams for those who haven’t signed up for a team yet so that no one gets left behind without a team</a:t>
             </a:r>
             <a:endParaRPr lang="ko-KR" altLang="en-US" sz="2400" dirty="0">
               <a:solidFill>
@@ -9420,8 +10489,19 @@
                   <a:schemeClr val="tx1"/>
                 </a:solidFill>
               </a:rPr>
-              <a:t>The unit coordinator should be able to upload projects (on behalf of industry partners if necessary)</a:t>
-            </a:r>
+              <a:t>Add a function that will generate teams automatically</a:t>
+            </a:r>
+          </a:p>
+          <a:p>
+            <a:pPr marL="342900" indent="-342900">
+              <a:buFont typeface="Arial" panose="020B0604020202020204" pitchFamily="34" charset="0"/>
+              <a:buChar char="•"/>
+            </a:pPr>
+            <a:endParaRPr lang="en-AU" sz="2000" dirty="0">
+              <a:solidFill>
+                <a:schemeClr val="tx1"/>
+              </a:solidFill>
+            </a:endParaRPr>
           </a:p>
         </p:txBody>
       </p:sp>
@@ -9620,7 +10700,7 @@
                   <a:schemeClr val="tx1"/>
                 </a:solidFill>
               </a:rPr>
-              <a:t> Need to be discussed during the developing process</a:t>
+              <a:t> Algorithms for generating teams need to be discussed as we develop</a:t>
             </a:r>
           </a:p>
         </p:txBody>
@@ -9628,7 +10708,7 @@
     </p:spTree>
     <p:extLst>
       <p:ext uri="{BB962C8B-B14F-4D97-AF65-F5344CB8AC3E}">
-        <p14:creationId xmlns:p14="http://schemas.microsoft.com/office/powerpoint/2010/main" val="3360574575"/>
+        <p14:creationId xmlns:p14="http://schemas.microsoft.com/office/powerpoint/2010/main" val="276816726"/>
       </p:ext>
     </p:extLst>
   </p:cSld>
@@ -9760,7 +10840,7 @@
             <a:pPr algn="ctr"/>
             <a:r>
               <a:rPr lang="en-AU" sz="2800" dirty="0"/>
-              <a:t>View CV/Cover Letters</a:t>
+              <a:t>Edit Teams</a:t>
             </a:r>
           </a:p>
         </p:txBody>
@@ -9819,7 +10899,7 @@
                   <a:schemeClr val="tx1"/>
                 </a:solidFill>
               </a:rPr>
-              <a:t>As the unit coordinator, I want to be able to see cover letters and CVs that students uploaded so that they can be marked and be used to rank teams later</a:t>
+              <a:t>As the unit coordinator, I want to be able to edit teams so that a student can be added and/or removed from the team</a:t>
             </a:r>
             <a:endParaRPr lang="ko-KR" altLang="en-US" sz="2400" dirty="0">
               <a:solidFill>
@@ -9904,7 +10984,7 @@
                   <a:schemeClr val="tx1"/>
                 </a:solidFill>
               </a:rPr>
-              <a:t>The unit coordinator should be able to see cover letters and CV</a:t>
+              <a:t>The coordinator should be able to add/remove team members</a:t>
             </a:r>
           </a:p>
         </p:txBody>
@@ -10104,7 +11184,7 @@
                   <a:schemeClr val="tx1"/>
                 </a:solidFill>
               </a:rPr>
-              <a:t> For marking purposes too</a:t>
+              <a:t> </a:t>
             </a:r>
           </a:p>
         </p:txBody>
@@ -10112,7 +11192,7 @@
     </p:spTree>
     <p:extLst>
       <p:ext uri="{BB962C8B-B14F-4D97-AF65-F5344CB8AC3E}">
-        <p14:creationId xmlns:p14="http://schemas.microsoft.com/office/powerpoint/2010/main" val="35284914"/>
+        <p14:creationId xmlns:p14="http://schemas.microsoft.com/office/powerpoint/2010/main" val="3834474679"/>
       </p:ext>
     </p:extLst>
   </p:cSld>
@@ -10244,7 +11324,7 @@
             <a:pPr algn="ctr"/>
             <a:r>
               <a:rPr lang="en-AU" sz="2800" dirty="0"/>
-              <a:t>Rank Teams for Projects</a:t>
+              <a:t>Upload Projects</a:t>
             </a:r>
           </a:p>
         </p:txBody>
@@ -10303,7 +11383,7 @@
                   <a:schemeClr val="tx1"/>
                 </a:solidFill>
               </a:rPr>
-              <a:t>As the unit coordinator, I want to be able to rank teams for projects so that students will be allocated with projects</a:t>
+              <a:t>As the unit coordinator, I want to be able to upload projects so that students can read through the project outline and apply for them later</a:t>
             </a:r>
             <a:endParaRPr lang="ko-KR" altLang="en-US" sz="2400" dirty="0">
               <a:solidFill>
@@ -10388,7 +11468,7 @@
                   <a:schemeClr val="tx1"/>
                 </a:solidFill>
               </a:rPr>
-              <a:t>The unit coordinator should be able to rank teams for projects on behalf of project supervisors</a:t>
+              <a:t>The unit coordinator should be able to upload projects (on behalf of industry partners if necessary)</a:t>
             </a:r>
           </a:p>
         </p:txBody>
@@ -10588,7 +11668,7 @@
                   <a:schemeClr val="tx1"/>
                 </a:solidFill>
               </a:rPr>
-              <a:t> Needs to be discussed</a:t>
+              <a:t> Need to be discussed during the developing process</a:t>
             </a:r>
           </a:p>
         </p:txBody>
@@ -10596,7 +11676,7 @@
     </p:spTree>
     <p:extLst>
       <p:ext uri="{BB962C8B-B14F-4D97-AF65-F5344CB8AC3E}">
-        <p14:creationId xmlns:p14="http://schemas.microsoft.com/office/powerpoint/2010/main" val="2080687648"/>
+        <p14:creationId xmlns:p14="http://schemas.microsoft.com/office/powerpoint/2010/main" val="3360574575"/>
       </p:ext>
     </p:extLst>
   </p:cSld>

</xml_diff>